<commit_message>
working on Module 1
</commit_message>
<xml_diff>
--- a/Modules/01.getting-started/Slides.pptx
+++ b/Modules/01.getting-started/Slides.pptx
@@ -5,10 +5,10 @@
     <p:sldMasterId id="2147483731" r:id="rId4"/>
   </p:sldMasterIdLst>
   <p:notesMasterIdLst>
-    <p:notesMasterId r:id="rId29"/>
+    <p:notesMasterId r:id="rId31"/>
   </p:notesMasterIdLst>
   <p:handoutMasterIdLst>
-    <p:handoutMasterId r:id="rId30"/>
+    <p:handoutMasterId r:id="rId32"/>
   </p:handoutMasterIdLst>
   <p:sldIdLst>
     <p:sldId id="356" r:id="rId5"/>
@@ -29,12 +29,14 @@
     <p:sldId id="402" r:id="rId20"/>
     <p:sldId id="385" r:id="rId21"/>
     <p:sldId id="386" r:id="rId22"/>
-    <p:sldId id="387" r:id="rId23"/>
-    <p:sldId id="388" r:id="rId24"/>
-    <p:sldId id="389" r:id="rId25"/>
-    <p:sldId id="390" r:id="rId26"/>
-    <p:sldId id="395" r:id="rId27"/>
-    <p:sldId id="394" r:id="rId28"/>
+    <p:sldId id="403" r:id="rId23"/>
+    <p:sldId id="404" r:id="rId24"/>
+    <p:sldId id="387" r:id="rId25"/>
+    <p:sldId id="388" r:id="rId26"/>
+    <p:sldId id="389" r:id="rId27"/>
+    <p:sldId id="390" r:id="rId28"/>
+    <p:sldId id="395" r:id="rId29"/>
+    <p:sldId id="394" r:id="rId30"/>
   </p:sldIdLst>
   <p:sldSz cx="9144000" cy="6858000" type="screen4x3"/>
   <p:notesSz cx="7315200" cy="9601200"/>
@@ -186,6 +188,8 @@
             <p14:sldId id="402"/>
             <p14:sldId id="385"/>
             <p14:sldId id="386"/>
+            <p14:sldId id="403"/>
+            <p14:sldId id="404"/>
             <p14:sldId id="387"/>
             <p14:sldId id="388"/>
             <p14:sldId id="389"/>
@@ -311,7 +315,7 @@
             <a:fld id="{923FAA13-3E1B-4A40-BCE0-2A4101C91A56}" type="datetimeFigureOut">
               <a:rPr lang="en-US" smtClean="0"/>
               <a:pPr/>
-              <a:t>4/28/2013</a:t>
+              <a:t>5/2/2013</a:t>
             </a:fld>
             <a:endParaRPr lang="en-US"/>
           </a:p>
@@ -921,7 +925,15 @@
             </a:r>
             <a:r>
               <a:rPr lang="en-US" baseline="0" dirty="0" smtClean="0"/>
-              <a:t>. and learn how the skills you acquired while building XAML based applications can be directly applied to building HTML applications.  </a:t>
+              <a:t>. and learn how the skills you acquired while building XAML based applications, such as your MVVM skills and you knowledge of how </a:t>
+            </a:r>
+            <a:r>
+              <a:rPr lang="en-US" baseline="0" smtClean="0"/>
+              <a:t>binding works, </a:t>
+            </a:r>
+            <a:r>
+              <a:rPr lang="en-US" baseline="0" dirty="0" smtClean="0"/>
+              <a:t>can be directly applied to building HTML applications.  </a:t>
             </a:r>
           </a:p>
           <a:p>
@@ -1044,11 +1056,7 @@
             </a:r>
             <a:r>
               <a:rPr lang="en-US" baseline="0" dirty="0" smtClean="0"/>
-              <a:t> </a:t>
-            </a:r>
-            <a:r>
-              <a:rPr lang="en-US" baseline="0" smtClean="0"/>
-              <a:t>and knockout</a:t>
+              <a:t> and knockout</a:t>
             </a:r>
             <a:endParaRPr lang="en-US" dirty="0"/>
           </a:p>
@@ -1185,25 +1193,27 @@
             </a:pPr>
             <a:r>
               <a:rPr lang="en-US" baseline="0" dirty="0" smtClean="0"/>
-              <a:t>[SHOW ANIMATION NOW</a:t>
-            </a:r>
+              <a:t>[SHOW ANIMATION NOW]</a:t>
+            </a:r>
+          </a:p>
+          <a:p>
             <a:r>
               <a:rPr lang="en-US" baseline="0" dirty="0" smtClean="0"/>
-              <a:t>]</a:t>
-            </a:r>
+              <a:t>In XAML, assuming your not using some sort of View Model locator the binding code in your code behind would look something like what is being shown on screen.</a:t>
+            </a:r>
+          </a:p>
+          <a:p>
             <a:endParaRPr lang="en-US" baseline="0" dirty="0" smtClean="0"/>
           </a:p>
           <a:p>
             <a:r>
               <a:rPr lang="en-US" baseline="0" dirty="0" smtClean="0"/>
-              <a:t>In XAML, assuming your not using some sort of View Model locator the binding code in your code behind would look something like what is being shown on screen</a:t>
-            </a:r>
-            <a:r>
-              <a:rPr lang="en-US" baseline="0" dirty="0" smtClean="0"/>
-              <a:t>.</a:t>
-            </a:r>
-          </a:p>
-          <a:p>
+              <a:t>[</a:t>
+            </a:r>
+            <a:r>
+              <a:rPr lang="en-US" baseline="0" smtClean="0"/>
+              <a:t>show animation]</a:t>
+            </a:r>
             <a:endParaRPr lang="en-US" baseline="0" dirty="0" smtClean="0"/>
           </a:p>
           <a:p>
@@ -1224,13 +1234,8 @@
           <a:p>
             <a:r>
               <a:rPr lang="en-US" baseline="0" dirty="0" smtClean="0"/>
-              <a:t>Next create an </a:t>
-            </a:r>
-            <a:r>
-              <a:rPr lang="en-US" baseline="0" dirty="0" smtClean="0"/>
-              <a:t>instance of the correct View Model </a:t>
-            </a:r>
-            <a:endParaRPr lang="en-US" baseline="0" dirty="0" smtClean="0"/>
+              <a:t>Next create an instance of the correct View Model </a:t>
+            </a:r>
           </a:p>
           <a:p>
             <a:endParaRPr lang="en-US" baseline="0" dirty="0" smtClean="0"/>
@@ -1244,15 +1249,7 @@
           <a:p>
             <a:r>
               <a:rPr lang="en-US" baseline="0" dirty="0" smtClean="0"/>
-              <a:t>Once we have our new view model we would </a:t>
-            </a:r>
-            <a:r>
-              <a:rPr lang="en-US" baseline="0" dirty="0" smtClean="0"/>
-              <a:t>assign it to </a:t>
-            </a:r>
-            <a:r>
-              <a:rPr lang="en-US" baseline="0" dirty="0" smtClean="0"/>
-              <a:t>the view’s </a:t>
+              <a:t>Once we have our new view model we would assign it to the view’s </a:t>
             </a:r>
             <a:r>
               <a:rPr lang="en-US" baseline="0" dirty="0" err="1" smtClean="0"/>
@@ -1268,7 +1265,6 @@
               <a:rPr lang="en-US" baseline="0" dirty="0" smtClean="0"/>
               <a:t>Once we have our of data context set the binding engine will take over and the magic will begin.</a:t>
             </a:r>
-            <a:endParaRPr lang="en-US" baseline="0" dirty="0" smtClean="0"/>
           </a:p>
         </p:txBody>
       </p:sp>
@@ -1444,7 +1440,6 @@
               <a:rPr lang="en-US" baseline="0" dirty="0" smtClean="0"/>
               <a:t>[show animation]</a:t>
             </a:r>
-            <a:endParaRPr lang="en-US" baseline="0" dirty="0" smtClean="0"/>
           </a:p>
           <a:p>
             <a:r>
@@ -1673,211 +1668,19 @@
           <a:p>
             <a:r>
               <a:rPr lang="en-US" dirty="0" smtClean="0"/>
-              <a:t>IN this module we will</a:t>
+              <a:t>Once we understand</a:t>
             </a:r>
             <a:r>
               <a:rPr lang="en-US" baseline="0" dirty="0" smtClean="0"/>
-              <a:t> be</a:t>
-            </a:r>
-            <a:r>
-              <a:rPr lang="en-US" dirty="0" smtClean="0"/>
-              <a:t> focusing on learning and acquiring</a:t>
+              <a:t> how to setup our data context to initialize our binding engine, the next logical thing to review is how to create an observable property.   An observable property is simply a property which allows for change notification to be raised to alert the </a:t>
+            </a:r>
+            <a:r>
+              <a:rPr lang="en-US" baseline="0" dirty="0" err="1" smtClean="0"/>
+              <a:t>ui</a:t>
             </a:r>
             <a:r>
               <a:rPr lang="en-US" baseline="0" dirty="0" smtClean="0"/>
-              <a:t> the skills needed to enable you to get started building your first HTML application.  </a:t>
-            </a:r>
-          </a:p>
-          <a:p>
-            <a:pPr marL="0" marR="0" indent="0" algn="l" defTabSz="914400" rtl="0" eaLnBrk="0" fontAlgn="base" latinLnBrk="0" hangingPunct="0">
-              <a:lnSpc>
-                <a:spcPct val="100000"/>
-              </a:lnSpc>
-              <a:spcBef>
-                <a:spcPct val="30000"/>
-              </a:spcBef>
-              <a:spcAft>
-                <a:spcPct val="0"/>
-              </a:spcAft>
-              <a:buClrTx/>
-              <a:buSzTx/>
-              <a:buFontTx/>
-              <a:buNone/>
-              <a:tabLst/>
-              <a:defRPr/>
-            </a:pPr>
-            <a:endParaRPr lang="en-US" baseline="0" dirty="0" smtClean="0"/>
-          </a:p>
-          <a:p>
-            <a:pPr marL="0" marR="0" indent="0" algn="l" defTabSz="914400" rtl="0" eaLnBrk="0" fontAlgn="base" latinLnBrk="0" hangingPunct="0">
-              <a:lnSpc>
-                <a:spcPct val="100000"/>
-              </a:lnSpc>
-              <a:spcBef>
-                <a:spcPct val="30000"/>
-              </a:spcBef>
-              <a:spcAft>
-                <a:spcPct val="0"/>
-              </a:spcAft>
-              <a:buClrTx/>
-              <a:buSzTx/>
-              <a:buFontTx/>
-              <a:buNone/>
-              <a:tabLst/>
-              <a:defRPr/>
-            </a:pPr>
-            <a:r>
-              <a:rPr lang="en-US" baseline="0" dirty="0" smtClean="0"/>
-              <a:t>[SHOW ANIMATION NOW]</a:t>
-            </a:r>
-          </a:p>
-          <a:p>
-            <a:endParaRPr lang="en-US" baseline="0" dirty="0" smtClean="0"/>
-          </a:p>
-          <a:p>
-            <a:r>
-              <a:rPr lang="en-US" baseline="0" dirty="0" smtClean="0"/>
-              <a:t>We will start off by taking a look at some of the various XAML or MVVM skills you have acquired and how they can be translated to HTML.  In fact we are going to focus on 4 core components what all XAML developers should understand.  Which are how to set the current data context for the current, how to do text or data binding, how to use commanding to handle user interaction and finally how to change the look and feel of your application by using style converters.</a:t>
-            </a:r>
-          </a:p>
-          <a:p>
-            <a:endParaRPr lang="en-US" baseline="0" dirty="0" smtClean="0"/>
-          </a:p>
-          <a:p>
-            <a:pPr marL="0" marR="0" indent="0" algn="l" defTabSz="914400" rtl="0" eaLnBrk="0" fontAlgn="base" latinLnBrk="0" hangingPunct="0">
-              <a:lnSpc>
-                <a:spcPct val="100000"/>
-              </a:lnSpc>
-              <a:spcBef>
-                <a:spcPct val="30000"/>
-              </a:spcBef>
-              <a:spcAft>
-                <a:spcPct val="0"/>
-              </a:spcAft>
-              <a:buClrTx/>
-              <a:buSzTx/>
-              <a:buFontTx/>
-              <a:buNone/>
-              <a:tabLst/>
-              <a:defRPr/>
-            </a:pPr>
-            <a:r>
-              <a:rPr lang="en-US" baseline="0" dirty="0" smtClean="0"/>
-              <a:t>[SHOW ANIMATION NOW]</a:t>
-            </a:r>
-          </a:p>
-          <a:p>
-            <a:endParaRPr lang="en-US" baseline="0" dirty="0" smtClean="0"/>
-          </a:p>
-          <a:p>
-            <a:r>
-              <a:rPr lang="en-US" baseline="0" dirty="0" smtClean="0"/>
-              <a:t>Next we will review all the tools and frameworks we will be utilizing in this course while making the transition from being a XAML developer to an HTML developer.</a:t>
-            </a:r>
-          </a:p>
-          <a:p>
-            <a:endParaRPr lang="en-US" baseline="0" dirty="0" smtClean="0"/>
-          </a:p>
-          <a:p>
-            <a:pPr marL="0" marR="0" indent="0" algn="l" defTabSz="914400" rtl="0" eaLnBrk="0" fontAlgn="base" latinLnBrk="0" hangingPunct="0">
-              <a:lnSpc>
-                <a:spcPct val="100000"/>
-              </a:lnSpc>
-              <a:spcBef>
-                <a:spcPct val="30000"/>
-              </a:spcBef>
-              <a:spcAft>
-                <a:spcPct val="0"/>
-              </a:spcAft>
-              <a:buClrTx/>
-              <a:buSzTx/>
-              <a:buFontTx/>
-              <a:buNone/>
-              <a:tabLst/>
-              <a:defRPr/>
-            </a:pPr>
-            <a:r>
-              <a:rPr lang="en-US" baseline="0" dirty="0" smtClean="0"/>
-              <a:t>[SHOW ANIMATION NOW]</a:t>
-            </a:r>
-          </a:p>
-          <a:p>
-            <a:endParaRPr lang="en-US" baseline="0" dirty="0" smtClean="0"/>
-          </a:p>
-          <a:p>
-            <a:r>
-              <a:rPr lang="en-US" baseline="0" dirty="0" smtClean="0"/>
-              <a:t>Following this we will actually crack open visual studio and create our first Asp.net MVC project, this will be the base template we will use for all of our coding demos in this course</a:t>
-            </a:r>
-          </a:p>
-          <a:p>
-            <a:endParaRPr lang="en-US" baseline="0" dirty="0" smtClean="0"/>
-          </a:p>
-          <a:p>
-            <a:pPr marL="0" marR="0" indent="0" algn="l" defTabSz="914400" rtl="0" eaLnBrk="0" fontAlgn="base" latinLnBrk="0" hangingPunct="0">
-              <a:lnSpc>
-                <a:spcPct val="100000"/>
-              </a:lnSpc>
-              <a:spcBef>
-                <a:spcPct val="30000"/>
-              </a:spcBef>
-              <a:spcAft>
-                <a:spcPct val="0"/>
-              </a:spcAft>
-              <a:buClrTx/>
-              <a:buSzTx/>
-              <a:buFontTx/>
-              <a:buNone/>
-              <a:tabLst/>
-              <a:defRPr/>
-            </a:pPr>
-            <a:r>
-              <a:rPr lang="en-US" baseline="0" dirty="0" smtClean="0"/>
-              <a:t>[SHOW ANIMATION NOW]</a:t>
-            </a:r>
-          </a:p>
-          <a:p>
-            <a:endParaRPr lang="en-US" baseline="0" dirty="0" smtClean="0"/>
-          </a:p>
-          <a:p>
-            <a:r>
-              <a:rPr lang="en-US" baseline="0" dirty="0" smtClean="0"/>
-              <a:t>After this will put all the pieces together and build a very simply hello world application to give you an example of what type of skills you will acquire in this course.</a:t>
-            </a:r>
-          </a:p>
-          <a:p>
-            <a:endParaRPr lang="en-US" baseline="0" dirty="0" smtClean="0"/>
-          </a:p>
-          <a:p>
-            <a:pPr marL="0" marR="0" indent="0" algn="l" defTabSz="914400" rtl="0" eaLnBrk="0" fontAlgn="base" latinLnBrk="0" hangingPunct="0">
-              <a:lnSpc>
-                <a:spcPct val="100000"/>
-              </a:lnSpc>
-              <a:spcBef>
-                <a:spcPct val="30000"/>
-              </a:spcBef>
-              <a:spcAft>
-                <a:spcPct val="0"/>
-              </a:spcAft>
-              <a:buClrTx/>
-              <a:buSzTx/>
-              <a:buFontTx/>
-              <a:buNone/>
-              <a:tabLst/>
-              <a:defRPr/>
-            </a:pPr>
-            <a:r>
-              <a:rPr lang="en-US" baseline="0" dirty="0" smtClean="0"/>
-              <a:t>[SHOW ANIMATION NOW]</a:t>
-            </a:r>
-          </a:p>
-          <a:p>
-            <a:endParaRPr lang="en-US" baseline="0" dirty="0" smtClean="0"/>
-          </a:p>
-          <a:p>
-            <a:r>
-              <a:rPr lang="en-US" baseline="0" dirty="0" smtClean="0"/>
-              <a:t>Finally we will end by reviewing the Silverlight application we are going to be porting as well as what the finally HTML version of this port is expected to look like.</a:t>
+              <a:t> there are updates pending.  This is a core tenant in both XAML applications as well as Knockout ones so lets go ahead and take a look at how we create observable properties in knockout.</a:t>
             </a:r>
             <a:endParaRPr lang="en-US" dirty="0"/>
           </a:p>
@@ -1977,7 +1780,23 @@
           <a:bodyPr/>
           <a:lstStyle/>
           <a:p>
-            <a:endParaRPr lang="en-US" dirty="0"/>
+            <a:r>
+              <a:rPr lang="en-US" baseline="0" dirty="0" smtClean="0"/>
+              <a:t>When working with XAML applications the underlying feature which drives observables is the </a:t>
+            </a:r>
+            <a:r>
+              <a:rPr lang="en-US" baseline="0" dirty="0" err="1" smtClean="0"/>
+              <a:t>INotifyPropertyChanged</a:t>
+            </a:r>
+            <a:r>
+              <a:rPr lang="en-US" baseline="0" dirty="0" smtClean="0"/>
+              <a:t> interface.  It is with </a:t>
+            </a:r>
+            <a:r>
+              <a:rPr lang="en-US" baseline="0" dirty="0" err="1" smtClean="0"/>
+              <a:t>thi</a:t>
+            </a:r>
+            <a:endParaRPr lang="en-US" baseline="0" dirty="0" smtClean="0"/>
           </a:p>
         </p:txBody>
       </p:sp>
@@ -2021,7 +1840,7 @@
     </p:spTree>
     <p:extLst>
       <p:ext uri="{BB962C8B-B14F-4D97-AF65-F5344CB8AC3E}">
-        <p14:creationId xmlns:p14="http://schemas.microsoft.com/office/powerpoint/2010/main" val="1996593739"/>
+        <p14:creationId xmlns:p14="http://schemas.microsoft.com/office/powerpoint/2010/main" val="157769385"/>
       </p:ext>
     </p:extLst>
   </p:cSld>
@@ -2075,215 +1894,7 @@
           <a:bodyPr/>
           <a:lstStyle/>
           <a:p>
-            <a:r>
-              <a:rPr lang="en-US" dirty="0" smtClean="0"/>
-              <a:t>IN this module we will</a:t>
-            </a:r>
-            <a:r>
-              <a:rPr lang="en-US" baseline="0" dirty="0" smtClean="0"/>
-              <a:t> be</a:t>
-            </a:r>
-            <a:r>
-              <a:rPr lang="en-US" dirty="0" smtClean="0"/>
-              <a:t> focusing on learning and acquiring</a:t>
-            </a:r>
-            <a:r>
-              <a:rPr lang="en-US" baseline="0" dirty="0" smtClean="0"/>
-              <a:t> the skills needed to enable you to get started building your first HTML application.  </a:t>
-            </a:r>
-          </a:p>
-          <a:p>
-            <a:pPr marL="0" marR="0" indent="0" algn="l" defTabSz="914400" rtl="0" eaLnBrk="0" fontAlgn="base" latinLnBrk="0" hangingPunct="0">
-              <a:lnSpc>
-                <a:spcPct val="100000"/>
-              </a:lnSpc>
-              <a:spcBef>
-                <a:spcPct val="30000"/>
-              </a:spcBef>
-              <a:spcAft>
-                <a:spcPct val="0"/>
-              </a:spcAft>
-              <a:buClrTx/>
-              <a:buSzTx/>
-              <a:buFontTx/>
-              <a:buNone/>
-              <a:tabLst/>
-              <a:defRPr/>
-            </a:pPr>
             <a:endParaRPr lang="en-US" baseline="0" dirty="0" smtClean="0"/>
-          </a:p>
-          <a:p>
-            <a:pPr marL="0" marR="0" indent="0" algn="l" defTabSz="914400" rtl="0" eaLnBrk="0" fontAlgn="base" latinLnBrk="0" hangingPunct="0">
-              <a:lnSpc>
-                <a:spcPct val="100000"/>
-              </a:lnSpc>
-              <a:spcBef>
-                <a:spcPct val="30000"/>
-              </a:spcBef>
-              <a:spcAft>
-                <a:spcPct val="0"/>
-              </a:spcAft>
-              <a:buClrTx/>
-              <a:buSzTx/>
-              <a:buFontTx/>
-              <a:buNone/>
-              <a:tabLst/>
-              <a:defRPr/>
-            </a:pPr>
-            <a:r>
-              <a:rPr lang="en-US" baseline="0" dirty="0" smtClean="0"/>
-              <a:t>[SHOW ANIMATION NOW]</a:t>
-            </a:r>
-          </a:p>
-          <a:p>
-            <a:endParaRPr lang="en-US" baseline="0" dirty="0" smtClean="0"/>
-          </a:p>
-          <a:p>
-            <a:r>
-              <a:rPr lang="en-US" baseline="0" dirty="0" smtClean="0"/>
-              <a:t>We will start off by taking a look at some of the various XAML or MVVM skills you have acquired and how they can be translated to HTML.  In fact we are going to focus on 4 core components what all XAML developers should understand.  Which are how to set the current data context for the current, how to do text or data binding, how to use commanding to handle user interaction and finally how to change the look and feel of your application by using style converters.</a:t>
-            </a:r>
-          </a:p>
-          <a:p>
-            <a:endParaRPr lang="en-US" baseline="0" dirty="0" smtClean="0"/>
-          </a:p>
-          <a:p>
-            <a:pPr marL="0" marR="0" indent="0" algn="l" defTabSz="914400" rtl="0" eaLnBrk="0" fontAlgn="base" latinLnBrk="0" hangingPunct="0">
-              <a:lnSpc>
-                <a:spcPct val="100000"/>
-              </a:lnSpc>
-              <a:spcBef>
-                <a:spcPct val="30000"/>
-              </a:spcBef>
-              <a:spcAft>
-                <a:spcPct val="0"/>
-              </a:spcAft>
-              <a:buClrTx/>
-              <a:buSzTx/>
-              <a:buFontTx/>
-              <a:buNone/>
-              <a:tabLst/>
-              <a:defRPr/>
-            </a:pPr>
-            <a:r>
-              <a:rPr lang="en-US" baseline="0" dirty="0" smtClean="0"/>
-              <a:t>[SHOW ANIMATION NOW]</a:t>
-            </a:r>
-          </a:p>
-          <a:p>
-            <a:endParaRPr lang="en-US" baseline="0" dirty="0" smtClean="0"/>
-          </a:p>
-          <a:p>
-            <a:r>
-              <a:rPr lang="en-US" baseline="0" dirty="0" smtClean="0"/>
-              <a:t>Next we will review all the tools and frameworks we will be utilizing in this course while making the transition from being a XAML developer to an HTML developer.</a:t>
-            </a:r>
-          </a:p>
-          <a:p>
-            <a:endParaRPr lang="en-US" baseline="0" dirty="0" smtClean="0"/>
-          </a:p>
-          <a:p>
-            <a:pPr marL="0" marR="0" indent="0" algn="l" defTabSz="914400" rtl="0" eaLnBrk="0" fontAlgn="base" latinLnBrk="0" hangingPunct="0">
-              <a:lnSpc>
-                <a:spcPct val="100000"/>
-              </a:lnSpc>
-              <a:spcBef>
-                <a:spcPct val="30000"/>
-              </a:spcBef>
-              <a:spcAft>
-                <a:spcPct val="0"/>
-              </a:spcAft>
-              <a:buClrTx/>
-              <a:buSzTx/>
-              <a:buFontTx/>
-              <a:buNone/>
-              <a:tabLst/>
-              <a:defRPr/>
-            </a:pPr>
-            <a:r>
-              <a:rPr lang="en-US" baseline="0" dirty="0" smtClean="0"/>
-              <a:t>[SHOW ANIMATION NOW]</a:t>
-            </a:r>
-          </a:p>
-          <a:p>
-            <a:endParaRPr lang="en-US" baseline="0" dirty="0" smtClean="0"/>
-          </a:p>
-          <a:p>
-            <a:r>
-              <a:rPr lang="en-US" baseline="0" dirty="0" smtClean="0"/>
-              <a:t>Following this we will actually crack open visual studio and create our first Asp.net MVC project, this will be the base template we will use for all of our coding demos in this course</a:t>
-            </a:r>
-          </a:p>
-          <a:p>
-            <a:endParaRPr lang="en-US" baseline="0" dirty="0" smtClean="0"/>
-          </a:p>
-          <a:p>
-            <a:pPr marL="0" marR="0" indent="0" algn="l" defTabSz="914400" rtl="0" eaLnBrk="0" fontAlgn="base" latinLnBrk="0" hangingPunct="0">
-              <a:lnSpc>
-                <a:spcPct val="100000"/>
-              </a:lnSpc>
-              <a:spcBef>
-                <a:spcPct val="30000"/>
-              </a:spcBef>
-              <a:spcAft>
-                <a:spcPct val="0"/>
-              </a:spcAft>
-              <a:buClrTx/>
-              <a:buSzTx/>
-              <a:buFontTx/>
-              <a:buNone/>
-              <a:tabLst/>
-              <a:defRPr/>
-            </a:pPr>
-            <a:r>
-              <a:rPr lang="en-US" baseline="0" dirty="0" smtClean="0"/>
-              <a:t>[SHOW ANIMATION NOW]</a:t>
-            </a:r>
-          </a:p>
-          <a:p>
-            <a:endParaRPr lang="en-US" baseline="0" dirty="0" smtClean="0"/>
-          </a:p>
-          <a:p>
-            <a:r>
-              <a:rPr lang="en-US" baseline="0" dirty="0" smtClean="0"/>
-              <a:t>After this will put all the pieces together and build a very simply hello world application to give you an example of what type of skills you will acquire in this course.</a:t>
-            </a:r>
-          </a:p>
-          <a:p>
-            <a:endParaRPr lang="en-US" baseline="0" dirty="0" smtClean="0"/>
-          </a:p>
-          <a:p>
-            <a:pPr marL="0" marR="0" indent="0" algn="l" defTabSz="914400" rtl="0" eaLnBrk="0" fontAlgn="base" latinLnBrk="0" hangingPunct="0">
-              <a:lnSpc>
-                <a:spcPct val="100000"/>
-              </a:lnSpc>
-              <a:spcBef>
-                <a:spcPct val="30000"/>
-              </a:spcBef>
-              <a:spcAft>
-                <a:spcPct val="0"/>
-              </a:spcAft>
-              <a:buClrTx/>
-              <a:buSzTx/>
-              <a:buFontTx/>
-              <a:buNone/>
-              <a:tabLst/>
-              <a:defRPr/>
-            </a:pPr>
-            <a:r>
-              <a:rPr lang="en-US" baseline="0" dirty="0" smtClean="0"/>
-              <a:t>[SHOW ANIMATION NOW]</a:t>
-            </a:r>
-          </a:p>
-          <a:p>
-            <a:endParaRPr lang="en-US" baseline="0" dirty="0" smtClean="0"/>
-          </a:p>
-          <a:p>
-            <a:r>
-              <a:rPr lang="en-US" baseline="0" dirty="0" smtClean="0"/>
-              <a:t>Finally we will end by reviewing the Silverlight application we are going to be porting as well as what the finally HTML version of this port is expected to look like.</a:t>
-            </a:r>
-            <a:endParaRPr lang="en-US" dirty="0"/>
           </a:p>
         </p:txBody>
       </p:sp>
@@ -2327,7 +1938,7 @@
     </p:spTree>
     <p:extLst>
       <p:ext uri="{BB962C8B-B14F-4D97-AF65-F5344CB8AC3E}">
-        <p14:creationId xmlns:p14="http://schemas.microsoft.com/office/powerpoint/2010/main" val="3900872159"/>
+        <p14:creationId xmlns:p14="http://schemas.microsoft.com/office/powerpoint/2010/main" val="1172627949"/>
       </p:ext>
     </p:extLst>
   </p:cSld>
@@ -2425,7 +2036,7 @@
     </p:spTree>
     <p:extLst>
       <p:ext uri="{BB962C8B-B14F-4D97-AF65-F5344CB8AC3E}">
-        <p14:creationId xmlns:p14="http://schemas.microsoft.com/office/powerpoint/2010/main" val="2581011366"/>
+        <p14:creationId xmlns:p14="http://schemas.microsoft.com/office/powerpoint/2010/main" val="1996593739"/>
       </p:ext>
     </p:extLst>
   </p:cSld>
@@ -2731,7 +2342,7 @@
     </p:spTree>
     <p:extLst>
       <p:ext uri="{BB962C8B-B14F-4D97-AF65-F5344CB8AC3E}">
-        <p14:creationId xmlns:p14="http://schemas.microsoft.com/office/powerpoint/2010/main" val="2216201395"/>
+        <p14:creationId xmlns:p14="http://schemas.microsoft.com/office/powerpoint/2010/main" val="3900872159"/>
       </p:ext>
     </p:extLst>
   </p:cSld>
@@ -2829,7 +2440,7 @@
     </p:spTree>
     <p:extLst>
       <p:ext uri="{BB962C8B-B14F-4D97-AF65-F5344CB8AC3E}">
-        <p14:creationId xmlns:p14="http://schemas.microsoft.com/office/powerpoint/2010/main" val="1993715608"/>
+        <p14:creationId xmlns:p14="http://schemas.microsoft.com/office/powerpoint/2010/main" val="2581011366"/>
       </p:ext>
     </p:extLst>
   </p:cSld>
@@ -3157,53 +2768,132 @@
           <a:p>
             <a:r>
               <a:rPr lang="en-US" dirty="0" smtClean="0"/>
-              <a:t>In this module we explored</a:t>
+              <a:t>IN this module we will</a:t>
             </a:r>
             <a:r>
               <a:rPr lang="en-US" baseline="0" dirty="0" smtClean="0"/>
-              <a:t> everything we needed to know in order to get primed for making the transition from being a XAML developer to an HTML developer.  </a:t>
-            </a:r>
-          </a:p>
-          <a:p>
+              <a:t> be</a:t>
+            </a:r>
+            <a:r>
+              <a:rPr lang="en-US" dirty="0" smtClean="0"/>
+              <a:t> focusing on learning and acquiring</a:t>
+            </a:r>
+            <a:r>
+              <a:rPr lang="en-US" baseline="0" dirty="0" smtClean="0"/>
+              <a:t> the skills needed to enable you to get started building your first HTML application.  </a:t>
+            </a:r>
+          </a:p>
+          <a:p>
+            <a:pPr marL="0" marR="0" indent="0" algn="l" defTabSz="914400" rtl="0" eaLnBrk="0" fontAlgn="base" latinLnBrk="0" hangingPunct="0">
+              <a:lnSpc>
+                <a:spcPct val="100000"/>
+              </a:lnSpc>
+              <a:spcBef>
+                <a:spcPct val="30000"/>
+              </a:spcBef>
+              <a:spcAft>
+                <a:spcPct val="0"/>
+              </a:spcAft>
+              <a:buClrTx/>
+              <a:buSzTx/>
+              <a:buFontTx/>
+              <a:buNone/>
+              <a:tabLst/>
+              <a:defRPr/>
+            </a:pPr>
             <a:endParaRPr lang="en-US" baseline="0" dirty="0" smtClean="0"/>
           </a:p>
           <a:p>
+            <a:pPr marL="0" marR="0" indent="0" algn="l" defTabSz="914400" rtl="0" eaLnBrk="0" fontAlgn="base" latinLnBrk="0" hangingPunct="0">
+              <a:lnSpc>
+                <a:spcPct val="100000"/>
+              </a:lnSpc>
+              <a:spcBef>
+                <a:spcPct val="30000"/>
+              </a:spcBef>
+              <a:spcAft>
+                <a:spcPct val="0"/>
+              </a:spcAft>
+              <a:buClrTx/>
+              <a:buSzTx/>
+              <a:buFontTx/>
+              <a:buNone/>
+              <a:tabLst/>
+              <a:defRPr/>
+            </a:pPr>
             <a:r>
               <a:rPr lang="en-US" baseline="0" dirty="0" smtClean="0"/>
-              <a:t>We took a look at how some of you </a:t>
-            </a:r>
-            <a:r>
-              <a:rPr lang="en-US" baseline="0" dirty="0" err="1" smtClean="0"/>
-              <a:t>xaml</a:t>
-            </a:r>
+              <a:t>[SHOW ANIMATION NOW]</a:t>
+            </a:r>
+          </a:p>
+          <a:p>
+            <a:endParaRPr lang="en-US" baseline="0" dirty="0" smtClean="0"/>
+          </a:p>
+          <a:p>
             <a:r>
               <a:rPr lang="en-US" baseline="0" dirty="0" smtClean="0"/>
-              <a:t> skills, such as binding and commanding, can easily translate to building HTML applications</a:t>
+              <a:t>We will start off by taking a look at some of the various XAML or MVVM skills you have acquired and how they can be translated to HTML.  In fact we are going to focus on 4 core components what all XAML developers should understand.  Which are how to set the current data context for the current, how to do text or data binding, how to use commanding to handle user interaction and finally how to change the look and feel of your application by using style converters.</a:t>
             </a:r>
           </a:p>
           <a:p>
             <a:endParaRPr lang="en-US" baseline="0" dirty="0" smtClean="0"/>
           </a:p>
           <a:p>
+            <a:pPr marL="0" marR="0" indent="0" algn="l" defTabSz="914400" rtl="0" eaLnBrk="0" fontAlgn="base" latinLnBrk="0" hangingPunct="0">
+              <a:lnSpc>
+                <a:spcPct val="100000"/>
+              </a:lnSpc>
+              <a:spcBef>
+                <a:spcPct val="30000"/>
+              </a:spcBef>
+              <a:spcAft>
+                <a:spcPct val="0"/>
+              </a:spcAft>
+              <a:buClrTx/>
+              <a:buSzTx/>
+              <a:buFontTx/>
+              <a:buNone/>
+              <a:tabLst/>
+              <a:defRPr/>
+            </a:pPr>
             <a:r>
               <a:rPr lang="en-US" baseline="0" dirty="0" smtClean="0"/>
-              <a:t>We learned about many of the tools we will be using through this course, such as Knockout </a:t>
-            </a:r>
-            <a:r>
-              <a:rPr lang="en-US" baseline="0" dirty="0" err="1" smtClean="0"/>
-              <a:t>js</a:t>
-            </a:r>
+              <a:t>[SHOW ANIMATION NOW]</a:t>
+            </a:r>
+          </a:p>
+          <a:p>
+            <a:endParaRPr lang="en-US" baseline="0" dirty="0" smtClean="0"/>
+          </a:p>
+          <a:p>
             <a:r>
               <a:rPr lang="en-US" baseline="0" dirty="0" smtClean="0"/>
-              <a:t>, typescript and </a:t>
-            </a:r>
-            <a:r>
-              <a:rPr lang="en-US" baseline="0" dirty="0" err="1" smtClean="0"/>
-              <a:t>ASP.Net</a:t>
-            </a:r>
+              <a:t>Next we will review all the tools and frameworks we will be utilizing in this course while making the transition from being a XAML developer to an HTML developer.</a:t>
+            </a:r>
+          </a:p>
+          <a:p>
+            <a:endParaRPr lang="en-US" baseline="0" dirty="0" smtClean="0"/>
+          </a:p>
+          <a:p>
+            <a:pPr marL="0" marR="0" indent="0" algn="l" defTabSz="914400" rtl="0" eaLnBrk="0" fontAlgn="base" latinLnBrk="0" hangingPunct="0">
+              <a:lnSpc>
+                <a:spcPct val="100000"/>
+              </a:lnSpc>
+              <a:spcBef>
+                <a:spcPct val="30000"/>
+              </a:spcBef>
+              <a:spcAft>
+                <a:spcPct val="0"/>
+              </a:spcAft>
+              <a:buClrTx/>
+              <a:buSzTx/>
+              <a:buFontTx/>
+              <a:buNone/>
+              <a:tabLst/>
+              <a:defRPr/>
+            </a:pPr>
             <a:r>
               <a:rPr lang="en-US" baseline="0" dirty="0" smtClean="0"/>
-              <a:t> MVC</a:t>
+              <a:t>[SHOW ANIMATION NOW]</a:t>
             </a:r>
           </a:p>
           <a:p>
@@ -3212,15 +2902,33 @@
           <a:p>
             <a:r>
               <a:rPr lang="en-US" baseline="0" dirty="0" smtClean="0"/>
-              <a:t>We built our </a:t>
-            </a:r>
-            <a:r>
-              <a:rPr lang="en-US" baseline="0" dirty="0" err="1" smtClean="0"/>
-              <a:t>Asp.Net</a:t>
-            </a:r>
+              <a:t>Following this we will actually crack open visual studio and create our first Asp.net MVC project, this will be the base template we will use for all of our coding demos in this course</a:t>
+            </a:r>
+          </a:p>
+          <a:p>
+            <a:endParaRPr lang="en-US" baseline="0" dirty="0" smtClean="0"/>
+          </a:p>
+          <a:p>
+            <a:pPr marL="0" marR="0" indent="0" algn="l" defTabSz="914400" rtl="0" eaLnBrk="0" fontAlgn="base" latinLnBrk="0" hangingPunct="0">
+              <a:lnSpc>
+                <a:spcPct val="100000"/>
+              </a:lnSpc>
+              <a:spcBef>
+                <a:spcPct val="30000"/>
+              </a:spcBef>
+              <a:spcAft>
+                <a:spcPct val="0"/>
+              </a:spcAft>
+              <a:buClrTx/>
+              <a:buSzTx/>
+              <a:buFontTx/>
+              <a:buNone/>
+              <a:tabLst/>
+              <a:defRPr/>
+            </a:pPr>
             <a:r>
               <a:rPr lang="en-US" baseline="0" dirty="0" smtClean="0"/>
-              <a:t> MVC template project which we will use as our base project during this course</a:t>
+              <a:t>[SHOW ANIMATION NOW]</a:t>
             </a:r>
           </a:p>
           <a:p>
@@ -3229,16 +2937,33 @@
           <a:p>
             <a:r>
               <a:rPr lang="en-US" baseline="0" dirty="0" smtClean="0"/>
-              <a:t>We built a very simple hello world application to demonstrate how to use some of the tools we will be learning about during this course</a:t>
+              <a:t>After this will put all the pieces together and build a very simply hello world application to give you an example of what type of skills you will acquire in this course.</a:t>
             </a:r>
           </a:p>
           <a:p>
             <a:endParaRPr lang="en-US" baseline="0" dirty="0" smtClean="0"/>
           </a:p>
           <a:p>
+            <a:pPr marL="0" marR="0" indent="0" algn="l" defTabSz="914400" rtl="0" eaLnBrk="0" fontAlgn="base" latinLnBrk="0" hangingPunct="0">
+              <a:lnSpc>
+                <a:spcPct val="100000"/>
+              </a:lnSpc>
+              <a:spcBef>
+                <a:spcPct val="30000"/>
+              </a:spcBef>
+              <a:spcAft>
+                <a:spcPct val="0"/>
+              </a:spcAft>
+              <a:buClrTx/>
+              <a:buSzTx/>
+              <a:buFontTx/>
+              <a:buNone/>
+              <a:tabLst/>
+              <a:defRPr/>
+            </a:pPr>
             <a:r>
               <a:rPr lang="en-US" baseline="0" dirty="0" smtClean="0"/>
-              <a:t>We ended up by reviewing our reference Silverlight application we are going to be porting over to html in order to better understand our objectives for the course</a:t>
+              <a:t>[SHOW ANIMATION NOW]</a:t>
             </a:r>
           </a:p>
           <a:p>
@@ -3247,7 +2972,7 @@
           <a:p>
             <a:r>
               <a:rPr lang="en-US" baseline="0" dirty="0" smtClean="0"/>
-              <a:t>In the next module we will dive straight in and start the actual port of our reference application to html</a:t>
+              <a:t>Finally we will end by reviewing the Silverlight application we are going to be porting as well as what the finally HTML version of this port is expected to look like.</a:t>
             </a:r>
             <a:endParaRPr lang="en-US" dirty="0"/>
           </a:p>
@@ -3281,6 +3006,296 @@
                 <a:defRPr/>
               </a:pPr>
               <a:t>24</a:t>
+            </a:fld>
+            <a:endParaRPr lang="en-US">
+              <a:solidFill>
+                <a:srgbClr val="000000"/>
+              </a:solidFill>
+            </a:endParaRPr>
+          </a:p>
+        </p:txBody>
+      </p:sp>
+    </p:spTree>
+    <p:extLst>
+      <p:ext uri="{BB962C8B-B14F-4D97-AF65-F5344CB8AC3E}">
+        <p14:creationId xmlns:p14="http://schemas.microsoft.com/office/powerpoint/2010/main" val="2216201395"/>
+      </p:ext>
+    </p:extLst>
+  </p:cSld>
+  <p:clrMapOvr>
+    <a:masterClrMapping/>
+  </p:clrMapOvr>
+</p:notes>
+</file>
+
+<file path=ppt/notesSlides/notesSlide21.xml><?xml version="1.0" encoding="utf-8"?>
+<p:notes xmlns:a="http://schemas.openxmlformats.org/drawingml/2006/main" xmlns:r="http://schemas.openxmlformats.org/officeDocument/2006/relationships" xmlns:p="http://schemas.openxmlformats.org/presentationml/2006/main">
+  <p:cSld>
+    <p:spTree>
+      <p:nvGrpSpPr>
+        <p:cNvPr id="1" name=""/>
+        <p:cNvGrpSpPr/>
+        <p:nvPr/>
+      </p:nvGrpSpPr>
+      <p:grpSpPr>
+        <a:xfrm>
+          <a:off x="0" y="0"/>
+          <a:ext cx="0" cy="0"/>
+          <a:chOff x="0" y="0"/>
+          <a:chExt cx="0" cy="0"/>
+        </a:xfrm>
+      </p:grpSpPr>
+      <p:sp>
+        <p:nvSpPr>
+          <p:cNvPr id="2" name="Slide Image Placeholder 1"/>
+          <p:cNvSpPr>
+            <a:spLocks noGrp="1" noRot="1" noChangeAspect="1"/>
+          </p:cNvSpPr>
+          <p:nvPr>
+            <p:ph type="sldImg"/>
+          </p:nvPr>
+        </p:nvSpPr>
+        <p:spPr/>
+      </p:sp>
+      <p:sp>
+        <p:nvSpPr>
+          <p:cNvPr id="3" name="Notes Placeholder 2"/>
+          <p:cNvSpPr>
+            <a:spLocks noGrp="1"/>
+          </p:cNvSpPr>
+          <p:nvPr>
+            <p:ph type="body" idx="1"/>
+          </p:nvPr>
+        </p:nvSpPr>
+        <p:spPr/>
+        <p:txBody>
+          <a:bodyPr/>
+          <a:lstStyle/>
+          <a:p>
+            <a:endParaRPr lang="en-US" dirty="0"/>
+          </a:p>
+        </p:txBody>
+      </p:sp>
+      <p:sp>
+        <p:nvSpPr>
+          <p:cNvPr id="4" name="Slide Number Placeholder 3"/>
+          <p:cNvSpPr>
+            <a:spLocks noGrp="1"/>
+          </p:cNvSpPr>
+          <p:nvPr>
+            <p:ph type="sldNum" sz="quarter" idx="10"/>
+          </p:nvPr>
+        </p:nvSpPr>
+        <p:spPr/>
+        <p:txBody>
+          <a:bodyPr/>
+          <a:lstStyle/>
+          <a:p>
+            <a:pPr>
+              <a:defRPr/>
+            </a:pPr>
+            <a:fld id="{47C584BF-6945-4E60-B2A7-1638FF8EA8EE}" type="slidenum">
+              <a:rPr lang="en-US" smtClean="0">
+                <a:solidFill>
+                  <a:srgbClr val="000000"/>
+                </a:solidFill>
+              </a:rPr>
+              <a:pPr>
+                <a:defRPr/>
+              </a:pPr>
+              <a:t>25</a:t>
+            </a:fld>
+            <a:endParaRPr lang="en-US">
+              <a:solidFill>
+                <a:srgbClr val="000000"/>
+              </a:solidFill>
+            </a:endParaRPr>
+          </a:p>
+        </p:txBody>
+      </p:sp>
+    </p:spTree>
+    <p:extLst>
+      <p:ext uri="{BB962C8B-B14F-4D97-AF65-F5344CB8AC3E}">
+        <p14:creationId xmlns:p14="http://schemas.microsoft.com/office/powerpoint/2010/main" val="1993715608"/>
+      </p:ext>
+    </p:extLst>
+  </p:cSld>
+  <p:clrMapOvr>
+    <a:masterClrMapping/>
+  </p:clrMapOvr>
+</p:notes>
+</file>
+
+<file path=ppt/notesSlides/notesSlide22.xml><?xml version="1.0" encoding="utf-8"?>
+<p:notes xmlns:a="http://schemas.openxmlformats.org/drawingml/2006/main" xmlns:r="http://schemas.openxmlformats.org/officeDocument/2006/relationships" xmlns:p="http://schemas.openxmlformats.org/presentationml/2006/main">
+  <p:cSld>
+    <p:spTree>
+      <p:nvGrpSpPr>
+        <p:cNvPr id="1" name=""/>
+        <p:cNvGrpSpPr/>
+        <p:nvPr/>
+      </p:nvGrpSpPr>
+      <p:grpSpPr>
+        <a:xfrm>
+          <a:off x="0" y="0"/>
+          <a:ext cx="0" cy="0"/>
+          <a:chOff x="0" y="0"/>
+          <a:chExt cx="0" cy="0"/>
+        </a:xfrm>
+      </p:grpSpPr>
+      <p:sp>
+        <p:nvSpPr>
+          <p:cNvPr id="2" name="Slide Image Placeholder 1"/>
+          <p:cNvSpPr>
+            <a:spLocks noGrp="1" noRot="1" noChangeAspect="1"/>
+          </p:cNvSpPr>
+          <p:nvPr>
+            <p:ph type="sldImg"/>
+          </p:nvPr>
+        </p:nvSpPr>
+        <p:spPr/>
+      </p:sp>
+      <p:sp>
+        <p:nvSpPr>
+          <p:cNvPr id="3" name="Notes Placeholder 2"/>
+          <p:cNvSpPr>
+            <a:spLocks noGrp="1"/>
+          </p:cNvSpPr>
+          <p:nvPr>
+            <p:ph type="body" idx="1"/>
+          </p:nvPr>
+        </p:nvSpPr>
+        <p:spPr/>
+        <p:txBody>
+          <a:bodyPr/>
+          <a:lstStyle/>
+          <a:p>
+            <a:r>
+              <a:rPr lang="en-US" dirty="0" smtClean="0"/>
+              <a:t>In this module we explored</a:t>
+            </a:r>
+            <a:r>
+              <a:rPr lang="en-US" baseline="0" dirty="0" smtClean="0"/>
+              <a:t> everything we needed to know in order to get primed for making the transition from being a XAML developer to an HTML developer.  </a:t>
+            </a:r>
+          </a:p>
+          <a:p>
+            <a:endParaRPr lang="en-US" baseline="0" dirty="0" smtClean="0"/>
+          </a:p>
+          <a:p>
+            <a:r>
+              <a:rPr lang="en-US" baseline="0" dirty="0" smtClean="0"/>
+              <a:t>We took a look at how some of you </a:t>
+            </a:r>
+            <a:r>
+              <a:rPr lang="en-US" baseline="0" dirty="0" err="1" smtClean="0"/>
+              <a:t>xaml</a:t>
+            </a:r>
+            <a:r>
+              <a:rPr lang="en-US" baseline="0" dirty="0" smtClean="0"/>
+              <a:t> skills, such as binding and commanding, can easily translate to building HTML applications</a:t>
+            </a:r>
+          </a:p>
+          <a:p>
+            <a:endParaRPr lang="en-US" baseline="0" dirty="0" smtClean="0"/>
+          </a:p>
+          <a:p>
+            <a:r>
+              <a:rPr lang="en-US" baseline="0" dirty="0" smtClean="0"/>
+              <a:t>We learned about many of the tools we will be using through this course, such as Knockout </a:t>
+            </a:r>
+            <a:r>
+              <a:rPr lang="en-US" baseline="0" dirty="0" err="1" smtClean="0"/>
+              <a:t>js</a:t>
+            </a:r>
+            <a:r>
+              <a:rPr lang="en-US" baseline="0" dirty="0" smtClean="0"/>
+              <a:t>, typescript and </a:t>
+            </a:r>
+            <a:r>
+              <a:rPr lang="en-US" baseline="0" dirty="0" err="1" smtClean="0"/>
+              <a:t>ASP.Net</a:t>
+            </a:r>
+            <a:r>
+              <a:rPr lang="en-US" baseline="0" dirty="0" smtClean="0"/>
+              <a:t> MVC</a:t>
+            </a:r>
+          </a:p>
+          <a:p>
+            <a:endParaRPr lang="en-US" baseline="0" dirty="0" smtClean="0"/>
+          </a:p>
+          <a:p>
+            <a:r>
+              <a:rPr lang="en-US" baseline="0" dirty="0" smtClean="0"/>
+              <a:t>We built our </a:t>
+            </a:r>
+            <a:r>
+              <a:rPr lang="en-US" baseline="0" dirty="0" err="1" smtClean="0"/>
+              <a:t>Asp.Net</a:t>
+            </a:r>
+            <a:r>
+              <a:rPr lang="en-US" baseline="0" dirty="0" smtClean="0"/>
+              <a:t> MVC template project which we will use as our base project during this course</a:t>
+            </a:r>
+          </a:p>
+          <a:p>
+            <a:endParaRPr lang="en-US" baseline="0" dirty="0" smtClean="0"/>
+          </a:p>
+          <a:p>
+            <a:r>
+              <a:rPr lang="en-US" baseline="0" dirty="0" smtClean="0"/>
+              <a:t>We built a very simple hello world application to demonstrate how to use some of the tools we will be learning about during this course</a:t>
+            </a:r>
+          </a:p>
+          <a:p>
+            <a:endParaRPr lang="en-US" baseline="0" dirty="0" smtClean="0"/>
+          </a:p>
+          <a:p>
+            <a:r>
+              <a:rPr lang="en-US" baseline="0" dirty="0" smtClean="0"/>
+              <a:t>We ended up by reviewing our reference Silverlight application we are going to be porting over to html in order to better understand our objectives for the course</a:t>
+            </a:r>
+          </a:p>
+          <a:p>
+            <a:endParaRPr lang="en-US" baseline="0" dirty="0" smtClean="0"/>
+          </a:p>
+          <a:p>
+            <a:r>
+              <a:rPr lang="en-US" baseline="0" dirty="0" smtClean="0"/>
+              <a:t>In the next module we will dive straight in and start the actual port of our reference application to html</a:t>
+            </a:r>
+            <a:endParaRPr lang="en-US" dirty="0"/>
+          </a:p>
+        </p:txBody>
+      </p:sp>
+      <p:sp>
+        <p:nvSpPr>
+          <p:cNvPr id="4" name="Slide Number Placeholder 3"/>
+          <p:cNvSpPr>
+            <a:spLocks noGrp="1"/>
+          </p:cNvSpPr>
+          <p:nvPr>
+            <p:ph type="sldNum" sz="quarter" idx="10"/>
+          </p:nvPr>
+        </p:nvSpPr>
+        <p:spPr/>
+        <p:txBody>
+          <a:bodyPr/>
+          <a:lstStyle/>
+          <a:p>
+            <a:pPr>
+              <a:defRPr/>
+            </a:pPr>
+            <a:fld id="{47C584BF-6945-4E60-B2A7-1638FF8EA8EE}" type="slidenum">
+              <a:rPr lang="en-US" smtClean="0">
+                <a:solidFill>
+                  <a:srgbClr val="000000"/>
+                </a:solidFill>
+              </a:rPr>
+              <a:pPr>
+                <a:defRPr/>
+              </a:pPr>
+              <a:t>26</a:t>
             </a:fld>
             <a:endParaRPr lang="en-US">
               <a:solidFill>
@@ -3809,7 +3824,39 @@
           <a:p>
             <a:r>
               <a:rPr lang="en-US" dirty="0" smtClean="0"/>
-              <a:t>If we are going to dedicate an entire course to knockout we might as well set the definition for what this library provides</a:t>
+              <a:t>If we are going to dedicate an entire course </a:t>
+            </a:r>
+            <a:r>
+              <a:rPr lang="en-US" dirty="0" smtClean="0"/>
+              <a:t>to learning</a:t>
+            </a:r>
+            <a:r>
+              <a:rPr lang="en-US" baseline="0" dirty="0" smtClean="0"/>
+              <a:t> how to apply our </a:t>
+            </a:r>
+            <a:r>
+              <a:rPr lang="en-US" baseline="0" dirty="0" err="1" smtClean="0"/>
+              <a:t>xaml</a:t>
+            </a:r>
+            <a:r>
+              <a:rPr lang="en-US" baseline="0" dirty="0" smtClean="0"/>
+              <a:t> skills </a:t>
+            </a:r>
+            <a:r>
+              <a:rPr lang="en-US" dirty="0" smtClean="0"/>
+              <a:t>to knockout </a:t>
+            </a:r>
+            <a:r>
+              <a:rPr lang="en-US" dirty="0" err="1" smtClean="0"/>
+              <a:t>js</a:t>
+            </a:r>
+            <a:r>
+              <a:rPr lang="en-US" dirty="0" smtClean="0"/>
+              <a:t> </a:t>
+            </a:r>
+            <a:r>
+              <a:rPr lang="en-US" dirty="0" smtClean="0"/>
+              <a:t>we might as well set the definition for what this library provides</a:t>
             </a:r>
             <a:r>
               <a:rPr lang="en-US" baseline="0" dirty="0" smtClean="0"/>
@@ -4028,7 +4075,103 @@
                 <a:ea typeface="+mn-ea"/>
                 <a:cs typeface="+mn-cs"/>
               </a:rPr>
-              <a:t>a simple and obvious way to connect parts of your UI to your data model. You can construct a complex dynamic UIs easily using arbitrarily nested binding contexts.</a:t>
+              <a:t>a simple and obvious way to connect parts of your UI to your data model. You can construct a </a:t>
+            </a:r>
+            <a:r>
+              <a:rPr lang="en-US" sz="1200" b="0" i="0" kern="1200" dirty="0" smtClean="0">
+                <a:solidFill>
+                  <a:schemeClr val="tx1"/>
+                </a:solidFill>
+                <a:effectLst/>
+                <a:latin typeface="Arial" pitchFamily="34" charset="0"/>
+                <a:ea typeface="+mn-ea"/>
+                <a:cs typeface="+mn-cs"/>
+              </a:rPr>
+              <a:t>complex and </a:t>
+            </a:r>
+            <a:r>
+              <a:rPr lang="en-US" sz="1200" b="0" i="0" kern="1200" dirty="0" smtClean="0">
+                <a:solidFill>
+                  <a:schemeClr val="tx1"/>
+                </a:solidFill>
+                <a:effectLst/>
+                <a:latin typeface="Arial" pitchFamily="34" charset="0"/>
+                <a:ea typeface="+mn-ea"/>
+                <a:cs typeface="+mn-cs"/>
+              </a:rPr>
+              <a:t>dynamic </a:t>
+            </a:r>
+            <a:r>
+              <a:rPr lang="en-US" sz="1200" b="0" i="0" kern="1200" dirty="0" smtClean="0">
+                <a:solidFill>
+                  <a:schemeClr val="tx1"/>
+                </a:solidFill>
+                <a:effectLst/>
+                <a:latin typeface="Arial" pitchFamily="34" charset="0"/>
+                <a:ea typeface="+mn-ea"/>
+                <a:cs typeface="+mn-cs"/>
+              </a:rPr>
+              <a:t>user interface with</a:t>
+            </a:r>
+            <a:r>
+              <a:rPr lang="en-US" sz="1200" b="0" i="0" kern="1200" baseline="0" dirty="0" smtClean="0">
+                <a:solidFill>
+                  <a:schemeClr val="tx1"/>
+                </a:solidFill>
+                <a:effectLst/>
+                <a:latin typeface="Arial" pitchFamily="34" charset="0"/>
+                <a:ea typeface="+mn-ea"/>
+                <a:cs typeface="+mn-cs"/>
+              </a:rPr>
+              <a:t> ease</a:t>
+            </a:r>
+            <a:r>
+              <a:rPr lang="en-US" sz="1200" b="0" i="0" kern="1200" dirty="0" smtClean="0">
+                <a:solidFill>
+                  <a:schemeClr val="tx1"/>
+                </a:solidFill>
+                <a:effectLst/>
+                <a:latin typeface="Arial" pitchFamily="34" charset="0"/>
+                <a:ea typeface="+mn-ea"/>
+                <a:cs typeface="+mn-cs"/>
+              </a:rPr>
+              <a:t> using knockouts </a:t>
+            </a:r>
+            <a:r>
+              <a:rPr lang="en-US" sz="1200" b="0" i="0" kern="1200" dirty="0" err="1" smtClean="0">
+                <a:solidFill>
+                  <a:schemeClr val="tx1"/>
+                </a:solidFill>
+                <a:effectLst/>
+                <a:latin typeface="Arial" pitchFamily="34" charset="0"/>
+                <a:ea typeface="+mn-ea"/>
+                <a:cs typeface="+mn-cs"/>
+              </a:rPr>
+              <a:t>sinple</a:t>
+            </a:r>
+            <a:r>
+              <a:rPr lang="en-US" sz="1200" b="0" i="0" kern="1200" dirty="0" smtClean="0">
+                <a:solidFill>
+                  <a:schemeClr val="tx1"/>
+                </a:solidFill>
+                <a:effectLst/>
+                <a:latin typeface="Arial" pitchFamily="34" charset="0"/>
+                <a:ea typeface="+mn-ea"/>
+                <a:cs typeface="+mn-cs"/>
+              </a:rPr>
+              <a:t> </a:t>
+            </a:r>
+            <a:r>
+              <a:rPr lang="en-US" sz="1200" b="0" i="0" kern="1200" dirty="0" smtClean="0">
+                <a:solidFill>
+                  <a:schemeClr val="tx1"/>
+                </a:solidFill>
+                <a:effectLst/>
+                <a:latin typeface="Arial" pitchFamily="34" charset="0"/>
+                <a:ea typeface="+mn-ea"/>
+                <a:cs typeface="+mn-cs"/>
+              </a:rPr>
+              <a:t>binding contexts.</a:t>
             </a:r>
           </a:p>
           <a:p>
@@ -8007,401 +8150,9 @@
   <p:timing>
     <p:tnLst>
       <p:par>
-        <p:cTn id="1" dur="indefinite" restart="never" nodeType="tmRoot">
-          <p:childTnLst>
-            <p:seq concurrent="1" nextAc="seek">
-              <p:cTn id="2" dur="indefinite" nodeType="mainSeq">
-                <p:childTnLst>
-                  <p:par>
-                    <p:cTn id="3" fill="hold">
-                      <p:stCondLst>
-                        <p:cond delay="indefinite"/>
-                      </p:stCondLst>
-                      <p:childTnLst>
-                        <p:par>
-                          <p:cTn id="4" fill="hold">
-                            <p:stCondLst>
-                              <p:cond delay="0"/>
-                            </p:stCondLst>
-                            <p:childTnLst>
-                              <p:par>
-                                <p:cTn id="5" presetID="10" presetClass="entr" presetSubtype="0" fill="hold" grpId="0" nodeType="clickEffect">
-                                  <p:stCondLst>
-                                    <p:cond delay="0"/>
-                                  </p:stCondLst>
-                                  <p:childTnLst>
-                                    <p:set>
-                                      <p:cBhvr>
-                                        <p:cTn id="6" dur="1" fill="hold">
-                                          <p:stCondLst>
-                                            <p:cond delay="0"/>
-                                          </p:stCondLst>
-                                        </p:cTn>
-                                        <p:tgtEl>
-                                          <p:spTgt spid="3">
-                                            <p:txEl>
-                                              <p:pRg st="0" end="0"/>
-                                            </p:txEl>
-                                          </p:spTgt>
-                                        </p:tgtEl>
-                                        <p:attrNameLst>
-                                          <p:attrName>style.visibility</p:attrName>
-                                        </p:attrNameLst>
-                                      </p:cBhvr>
-                                      <p:to>
-                                        <p:strVal val="visible"/>
-                                      </p:to>
-                                    </p:set>
-                                    <p:animEffect transition="in" filter="fade">
-                                      <p:cBhvr>
-                                        <p:cTn id="7" dur="500"/>
-                                        <p:tgtEl>
-                                          <p:spTgt spid="3">
-                                            <p:txEl>
-                                              <p:pRg st="0" end="0"/>
-                                            </p:txEl>
-                                          </p:spTgt>
-                                        </p:tgtEl>
-                                      </p:cBhvr>
-                                    </p:animEffect>
-                                  </p:childTnLst>
-                                </p:cTn>
-                              </p:par>
-                            </p:childTnLst>
-                          </p:cTn>
-                        </p:par>
-                      </p:childTnLst>
-                    </p:cTn>
-                  </p:par>
-                  <p:par>
-                    <p:cTn id="8" fill="hold">
-                      <p:stCondLst>
-                        <p:cond delay="indefinite"/>
-                      </p:stCondLst>
-                      <p:childTnLst>
-                        <p:par>
-                          <p:cTn id="9" fill="hold">
-                            <p:stCondLst>
-                              <p:cond delay="0"/>
-                            </p:stCondLst>
-                            <p:childTnLst>
-                              <p:par>
-                                <p:cTn id="10" presetID="10" presetClass="entr" presetSubtype="0" fill="hold" grpId="0" nodeType="clickEffect">
-                                  <p:stCondLst>
-                                    <p:cond delay="0"/>
-                                  </p:stCondLst>
-                                  <p:childTnLst>
-                                    <p:set>
-                                      <p:cBhvr>
-                                        <p:cTn id="11" dur="1" fill="hold">
-                                          <p:stCondLst>
-                                            <p:cond delay="0"/>
-                                          </p:stCondLst>
-                                        </p:cTn>
-                                        <p:tgtEl>
-                                          <p:spTgt spid="3">
-                                            <p:txEl>
-                                              <p:pRg st="1" end="1"/>
-                                            </p:txEl>
-                                          </p:spTgt>
-                                        </p:tgtEl>
-                                        <p:attrNameLst>
-                                          <p:attrName>style.visibility</p:attrName>
-                                        </p:attrNameLst>
-                                      </p:cBhvr>
-                                      <p:to>
-                                        <p:strVal val="visible"/>
-                                      </p:to>
-                                    </p:set>
-                                    <p:animEffect transition="in" filter="fade">
-                                      <p:cBhvr>
-                                        <p:cTn id="12" dur="500"/>
-                                        <p:tgtEl>
-                                          <p:spTgt spid="3">
-                                            <p:txEl>
-                                              <p:pRg st="1" end="1"/>
-                                            </p:txEl>
-                                          </p:spTgt>
-                                        </p:tgtEl>
-                                      </p:cBhvr>
-                                    </p:animEffect>
-                                  </p:childTnLst>
-                                </p:cTn>
-                              </p:par>
-                            </p:childTnLst>
-                          </p:cTn>
-                        </p:par>
-                      </p:childTnLst>
-                    </p:cTn>
-                  </p:par>
-                  <p:par>
-                    <p:cTn id="13" fill="hold">
-                      <p:stCondLst>
-                        <p:cond delay="indefinite"/>
-                      </p:stCondLst>
-                      <p:childTnLst>
-                        <p:par>
-                          <p:cTn id="14" fill="hold">
-                            <p:stCondLst>
-                              <p:cond delay="0"/>
-                            </p:stCondLst>
-                            <p:childTnLst>
-                              <p:par>
-                                <p:cTn id="15" presetID="10" presetClass="entr" presetSubtype="0" fill="hold" grpId="0" nodeType="clickEffect">
-                                  <p:stCondLst>
-                                    <p:cond delay="0"/>
-                                  </p:stCondLst>
-                                  <p:childTnLst>
-                                    <p:set>
-                                      <p:cBhvr>
-                                        <p:cTn id="16" dur="1" fill="hold">
-                                          <p:stCondLst>
-                                            <p:cond delay="0"/>
-                                          </p:stCondLst>
-                                        </p:cTn>
-                                        <p:tgtEl>
-                                          <p:spTgt spid="3">
-                                            <p:txEl>
-                                              <p:pRg st="2" end="2"/>
-                                            </p:txEl>
-                                          </p:spTgt>
-                                        </p:tgtEl>
-                                        <p:attrNameLst>
-                                          <p:attrName>style.visibility</p:attrName>
-                                        </p:attrNameLst>
-                                      </p:cBhvr>
-                                      <p:to>
-                                        <p:strVal val="visible"/>
-                                      </p:to>
-                                    </p:set>
-                                    <p:animEffect transition="in" filter="fade">
-                                      <p:cBhvr>
-                                        <p:cTn id="17" dur="500"/>
-                                        <p:tgtEl>
-                                          <p:spTgt spid="3">
-                                            <p:txEl>
-                                              <p:pRg st="2" end="2"/>
-                                            </p:txEl>
-                                          </p:spTgt>
-                                        </p:tgtEl>
-                                      </p:cBhvr>
-                                    </p:animEffect>
-                                  </p:childTnLst>
-                                </p:cTn>
-                              </p:par>
-                            </p:childTnLst>
-                          </p:cTn>
-                        </p:par>
-                      </p:childTnLst>
-                    </p:cTn>
-                  </p:par>
-                  <p:par>
-                    <p:cTn id="18" fill="hold">
-                      <p:stCondLst>
-                        <p:cond delay="indefinite"/>
-                      </p:stCondLst>
-                      <p:childTnLst>
-                        <p:par>
-                          <p:cTn id="19" fill="hold">
-                            <p:stCondLst>
-                              <p:cond delay="0"/>
-                            </p:stCondLst>
-                            <p:childTnLst>
-                              <p:par>
-                                <p:cTn id="20" presetID="10" presetClass="entr" presetSubtype="0" fill="hold" grpId="0" nodeType="clickEffect">
-                                  <p:stCondLst>
-                                    <p:cond delay="0"/>
-                                  </p:stCondLst>
-                                  <p:childTnLst>
-                                    <p:set>
-                                      <p:cBhvr>
-                                        <p:cTn id="21" dur="1" fill="hold">
-                                          <p:stCondLst>
-                                            <p:cond delay="0"/>
-                                          </p:stCondLst>
-                                        </p:cTn>
-                                        <p:tgtEl>
-                                          <p:spTgt spid="3">
-                                            <p:txEl>
-                                              <p:pRg st="3" end="3"/>
-                                            </p:txEl>
-                                          </p:spTgt>
-                                        </p:tgtEl>
-                                        <p:attrNameLst>
-                                          <p:attrName>style.visibility</p:attrName>
-                                        </p:attrNameLst>
-                                      </p:cBhvr>
-                                      <p:to>
-                                        <p:strVal val="visible"/>
-                                      </p:to>
-                                    </p:set>
-                                    <p:animEffect transition="in" filter="fade">
-                                      <p:cBhvr>
-                                        <p:cTn id="22" dur="500"/>
-                                        <p:tgtEl>
-                                          <p:spTgt spid="3">
-                                            <p:txEl>
-                                              <p:pRg st="3" end="3"/>
-                                            </p:txEl>
-                                          </p:spTgt>
-                                        </p:tgtEl>
-                                      </p:cBhvr>
-                                    </p:animEffect>
-                                  </p:childTnLst>
-                                </p:cTn>
-                              </p:par>
-                            </p:childTnLst>
-                          </p:cTn>
-                        </p:par>
-                      </p:childTnLst>
-                    </p:cTn>
-                  </p:par>
-                  <p:par>
-                    <p:cTn id="23" fill="hold">
-                      <p:stCondLst>
-                        <p:cond delay="indefinite"/>
-                      </p:stCondLst>
-                      <p:childTnLst>
-                        <p:par>
-                          <p:cTn id="24" fill="hold">
-                            <p:stCondLst>
-                              <p:cond delay="0"/>
-                            </p:stCondLst>
-                            <p:childTnLst>
-                              <p:par>
-                                <p:cTn id="25" presetID="10" presetClass="entr" presetSubtype="0" fill="hold" grpId="0" nodeType="clickEffect">
-                                  <p:stCondLst>
-                                    <p:cond delay="0"/>
-                                  </p:stCondLst>
-                                  <p:childTnLst>
-                                    <p:set>
-                                      <p:cBhvr>
-                                        <p:cTn id="26" dur="1" fill="hold">
-                                          <p:stCondLst>
-                                            <p:cond delay="0"/>
-                                          </p:stCondLst>
-                                        </p:cTn>
-                                        <p:tgtEl>
-                                          <p:spTgt spid="3">
-                                            <p:txEl>
-                                              <p:pRg st="4" end="4"/>
-                                            </p:txEl>
-                                          </p:spTgt>
-                                        </p:tgtEl>
-                                        <p:attrNameLst>
-                                          <p:attrName>style.visibility</p:attrName>
-                                        </p:attrNameLst>
-                                      </p:cBhvr>
-                                      <p:to>
-                                        <p:strVal val="visible"/>
-                                      </p:to>
-                                    </p:set>
-                                    <p:animEffect transition="in" filter="fade">
-                                      <p:cBhvr>
-                                        <p:cTn id="27" dur="500"/>
-                                        <p:tgtEl>
-                                          <p:spTgt spid="3">
-                                            <p:txEl>
-                                              <p:pRg st="4" end="4"/>
-                                            </p:txEl>
-                                          </p:spTgt>
-                                        </p:tgtEl>
-                                      </p:cBhvr>
-                                    </p:animEffect>
-                                  </p:childTnLst>
-                                </p:cTn>
-                              </p:par>
-                            </p:childTnLst>
-                          </p:cTn>
-                        </p:par>
-                      </p:childTnLst>
-                    </p:cTn>
-                  </p:par>
-                  <p:par>
-                    <p:cTn id="28" fill="hold">
-                      <p:stCondLst>
-                        <p:cond delay="indefinite"/>
-                      </p:stCondLst>
-                      <p:childTnLst>
-                        <p:par>
-                          <p:cTn id="29" fill="hold">
-                            <p:stCondLst>
-                              <p:cond delay="0"/>
-                            </p:stCondLst>
-                            <p:childTnLst>
-                              <p:par>
-                                <p:cTn id="30" presetID="10" presetClass="entr" presetSubtype="0" fill="hold" grpId="0" nodeType="clickEffect">
-                                  <p:stCondLst>
-                                    <p:cond delay="0"/>
-                                  </p:stCondLst>
-                                  <p:childTnLst>
-                                    <p:set>
-                                      <p:cBhvr>
-                                        <p:cTn id="31" dur="1" fill="hold">
-                                          <p:stCondLst>
-                                            <p:cond delay="0"/>
-                                          </p:stCondLst>
-                                        </p:cTn>
-                                        <p:tgtEl>
-                                          <p:spTgt spid="3">
-                                            <p:txEl>
-                                              <p:pRg st="5" end="5"/>
-                                            </p:txEl>
-                                          </p:spTgt>
-                                        </p:tgtEl>
-                                        <p:attrNameLst>
-                                          <p:attrName>style.visibility</p:attrName>
-                                        </p:attrNameLst>
-                                      </p:cBhvr>
-                                      <p:to>
-                                        <p:strVal val="visible"/>
-                                      </p:to>
-                                    </p:set>
-                                    <p:animEffect transition="in" filter="fade">
-                                      <p:cBhvr>
-                                        <p:cTn id="32" dur="500"/>
-                                        <p:tgtEl>
-                                          <p:spTgt spid="3">
-                                            <p:txEl>
-                                              <p:pRg st="5" end="5"/>
-                                            </p:txEl>
-                                          </p:spTgt>
-                                        </p:tgtEl>
-                                      </p:cBhvr>
-                                    </p:animEffect>
-                                  </p:childTnLst>
-                                </p:cTn>
-                              </p:par>
-                            </p:childTnLst>
-                          </p:cTn>
-                        </p:par>
-                      </p:childTnLst>
-                    </p:cTn>
-                  </p:par>
-                </p:childTnLst>
-              </p:cTn>
-              <p:prevCondLst>
-                <p:cond evt="onPrev" delay="0">
-                  <p:tgtEl>
-                    <p:sldTgt/>
-                  </p:tgtEl>
-                </p:cond>
-              </p:prevCondLst>
-              <p:nextCondLst>
-                <p:cond evt="onNext" delay="0">
-                  <p:tgtEl>
-                    <p:sldTgt/>
-                  </p:tgtEl>
-                </p:cond>
-              </p:nextCondLst>
-            </p:seq>
-          </p:childTnLst>
-        </p:cTn>
+        <p:cTn id="1" dur="indefinite" restart="never" nodeType="tmRoot"/>
       </p:par>
     </p:tnLst>
-    <p:bldLst>
-      <p:bldP spid="3" grpId="0" build="p"/>
-    </p:bldLst>
   </p:timing>
 </p:sld>
 </file>
@@ -8633,16 +8384,7 @@
                 </a:solidFill>
                 <a:latin typeface="Myriad Pro"/>
               </a:rPr>
-              <a:t>Create an instance of </a:t>
-            </a:r>
-            <a:r>
-              <a:rPr lang="en-US" dirty="0" smtClean="0">
-                <a:solidFill>
-                  <a:prstClr val="black"/>
-                </a:solidFill>
-                <a:latin typeface="Myriad Pro"/>
-              </a:rPr>
-              <a:t>the </a:t>
+              <a:t>Create an instance of the </a:t>
             </a:r>
           </a:p>
           <a:p>
@@ -11008,16 +10750,8 @@
 </file>
 
 <file path=ppt/slides/slide19.xml><?xml version="1.0" encoding="utf-8"?>
-<p:sld xmlns:a="http://schemas.openxmlformats.org/drawingml/2006/main" xmlns:r="http://schemas.openxmlformats.org/officeDocument/2006/relationships" xmlns:p="http://schemas.openxmlformats.org/presentationml/2006/main" show="0">
+<p:sld xmlns:a="http://schemas.openxmlformats.org/drawingml/2006/main" xmlns:r="http://schemas.openxmlformats.org/officeDocument/2006/relationships" xmlns:p="http://schemas.openxmlformats.org/presentationml/2006/main">
   <p:cSld>
-    <p:bg>
-      <p:bgPr>
-        <a:solidFill>
-          <a:schemeClr val="accent2"/>
-        </a:solidFill>
-        <a:effectLst/>
-      </p:bgPr>
-    </p:bg>
     <p:spTree>
       <p:nvGrpSpPr>
         <p:cNvPr id="1" name=""/>
@@ -11032,6 +10766,30 @@
           <a:chExt cx="0" cy="0"/>
         </a:xfrm>
       </p:grpSpPr>
+      <p:pic>
+        <p:nvPicPr>
+          <p:cNvPr id="4" name="Picture 3"/>
+          <p:cNvPicPr>
+            <a:picLocks noChangeAspect="1"/>
+          </p:cNvPicPr>
+          <p:nvPr/>
+        </p:nvPicPr>
+        <p:blipFill>
+          <a:blip r:embed="rId3"/>
+          <a:stretch>
+            <a:fillRect/>
+          </a:stretch>
+        </p:blipFill>
+        <p:spPr>
+          <a:xfrm>
+            <a:off x="762000" y="1640840"/>
+            <a:ext cx="4562475" cy="2400300"/>
+          </a:xfrm>
+          <a:prstGeom prst="rect">
+            <a:avLst/>
+          </a:prstGeom>
+        </p:spPr>
+      </p:pic>
       <p:sp>
         <p:nvSpPr>
           <p:cNvPr id="2" name="Title 1"/>
@@ -11049,42 +10807,371 @@
           <a:p>
             <a:r>
               <a:rPr lang="en-US" dirty="0" smtClean="0"/>
-              <a:t>END OF Overview Slides		</a:t>
+              <a:t>Observable Properties		 -- </a:t>
+            </a:r>
+            <a:r>
+              <a:rPr lang="en-US" dirty="0" err="1" smtClean="0"/>
+              <a:t>Xaml</a:t>
+            </a:r>
+            <a:r>
+              <a:rPr lang="en-US" dirty="0" smtClean="0"/>
+              <a:t> Way</a:t>
             </a:r>
             <a:endParaRPr lang="en-GB" dirty="0"/>
           </a:p>
         </p:txBody>
       </p:sp>
+      <p:cxnSp>
+        <p:nvCxnSpPr>
+          <p:cNvPr id="10" name="Straight Arrow Connector 9"/>
+          <p:cNvCxnSpPr>
+            <a:stCxn id="12" idx="1"/>
+          </p:cNvCxnSpPr>
+          <p:nvPr/>
+        </p:nvCxnSpPr>
+        <p:spPr bwMode="auto">
+          <a:xfrm flipH="1">
+            <a:off x="3657600" y="1770966"/>
+            <a:ext cx="2412817" cy="38099"/>
+          </a:xfrm>
+          <a:prstGeom prst="straightConnector1">
+            <a:avLst/>
+          </a:prstGeom>
+          <a:ln w="63500">
+            <a:solidFill>
+              <a:schemeClr val="tx1"/>
+            </a:solidFill>
+            <a:headEnd type="none" w="med" len="med"/>
+            <a:tailEnd type="triangle"/>
+          </a:ln>
+        </p:spPr>
+        <p:style>
+          <a:lnRef idx="1">
+            <a:schemeClr val="accent2"/>
+          </a:lnRef>
+          <a:fillRef idx="0">
+            <a:schemeClr val="accent2"/>
+          </a:fillRef>
+          <a:effectRef idx="0">
+            <a:schemeClr val="accent2"/>
+          </a:effectRef>
+          <a:fontRef idx="minor">
+            <a:schemeClr val="tx1"/>
+          </a:fontRef>
+        </p:style>
+      </p:cxnSp>
       <p:sp>
         <p:nvSpPr>
-          <p:cNvPr id="3" name="Text Placeholder 2"/>
-          <p:cNvSpPr>
-            <a:spLocks noGrp="1"/>
-          </p:cNvSpPr>
-          <p:nvPr>
-            <p:ph type="body" idx="1"/>
-          </p:nvPr>
+          <p:cNvPr id="12" name="TextBox 11"/>
+          <p:cNvSpPr txBox="1"/>
+          <p:nvPr/>
         </p:nvSpPr>
-        <p:spPr/>
+        <p:spPr bwMode="auto">
+          <a:xfrm>
+            <a:off x="6070417" y="1447800"/>
+            <a:ext cx="2729017" cy="646331"/>
+          </a:xfrm>
+          <a:prstGeom prst="rect">
+            <a:avLst/>
+          </a:prstGeom>
+          <a:noFill/>
+          <a:ln w="9525">
+            <a:noFill/>
+            <a:miter lim="800000"/>
+            <a:headEnd/>
+            <a:tailEnd/>
+          </a:ln>
+        </p:spPr>
         <p:txBody>
-          <a:bodyPr/>
+          <a:bodyPr wrap="none" rtlCol="0">
+            <a:spAutoFit/>
+          </a:bodyPr>
           <a:lstStyle/>
           <a:p>
-            <a:pPr marL="0" indent="0">
-              <a:buNone/>
-            </a:pPr>
-            <a:r>
-              <a:rPr lang="en-GB" dirty="0" smtClean="0"/>
-              <a:t>	</a:t>
-            </a:r>
-            <a:endParaRPr lang="en-GB" dirty="0"/>
+            <a:r>
+              <a:rPr lang="en-US" dirty="0" smtClean="0">
+                <a:solidFill>
+                  <a:prstClr val="black"/>
+                </a:solidFill>
+                <a:latin typeface="Myriad Pro"/>
+              </a:rPr>
+              <a:t>Create our backing field to</a:t>
+            </a:r>
+          </a:p>
+          <a:p>
+            <a:r>
+              <a:rPr lang="en-US" dirty="0" smtClean="0">
+                <a:solidFill>
+                  <a:prstClr val="black"/>
+                </a:solidFill>
+                <a:latin typeface="Myriad Pro"/>
+              </a:rPr>
+              <a:t>Store the value</a:t>
+            </a:r>
+            <a:endParaRPr lang="en-US" dirty="0">
+              <a:solidFill>
+                <a:prstClr val="black"/>
+              </a:solidFill>
+              <a:latin typeface="Myriad Pro"/>
+            </a:endParaRPr>
+          </a:p>
+        </p:txBody>
+      </p:sp>
+      <p:cxnSp>
+        <p:nvCxnSpPr>
+          <p:cNvPr id="14" name="Straight Arrow Connector 13"/>
+          <p:cNvCxnSpPr/>
+          <p:nvPr/>
+        </p:nvCxnSpPr>
+        <p:spPr bwMode="auto">
+          <a:xfrm flipH="1">
+            <a:off x="4953000" y="2719864"/>
+            <a:ext cx="1066800" cy="11668"/>
+          </a:xfrm>
+          <a:prstGeom prst="straightConnector1">
+            <a:avLst/>
+          </a:prstGeom>
+          <a:ln w="63500">
+            <a:solidFill>
+              <a:schemeClr val="tx1"/>
+            </a:solidFill>
+            <a:headEnd type="none" w="med" len="med"/>
+            <a:tailEnd type="triangle"/>
+          </a:ln>
+        </p:spPr>
+        <p:style>
+          <a:lnRef idx="1">
+            <a:schemeClr val="accent2"/>
+          </a:lnRef>
+          <a:fillRef idx="0">
+            <a:schemeClr val="accent2"/>
+          </a:fillRef>
+          <a:effectRef idx="0">
+            <a:schemeClr val="accent2"/>
+          </a:effectRef>
+          <a:fontRef idx="minor">
+            <a:schemeClr val="tx1"/>
+          </a:fontRef>
+        </p:style>
+      </p:cxnSp>
+      <p:sp>
+        <p:nvSpPr>
+          <p:cNvPr id="16" name="TextBox 15"/>
+          <p:cNvSpPr txBox="1"/>
+          <p:nvPr/>
+        </p:nvSpPr>
+        <p:spPr bwMode="auto">
+          <a:xfrm>
+            <a:off x="6070417" y="2502932"/>
+            <a:ext cx="2491644" cy="369332"/>
+          </a:xfrm>
+          <a:prstGeom prst="rect">
+            <a:avLst/>
+          </a:prstGeom>
+          <a:noFill/>
+          <a:ln w="9525">
+            <a:noFill/>
+            <a:miter lim="800000"/>
+            <a:headEnd/>
+            <a:tailEnd/>
+          </a:ln>
+        </p:spPr>
+        <p:txBody>
+          <a:bodyPr wrap="none" rtlCol="0">
+            <a:spAutoFit/>
+          </a:bodyPr>
+          <a:lstStyle/>
+          <a:p>
+            <a:r>
+              <a:rPr lang="en-US" dirty="0" smtClean="0">
+                <a:solidFill>
+                  <a:prstClr val="black"/>
+                </a:solidFill>
+                <a:latin typeface="Myriad Pro"/>
+              </a:rPr>
+              <a:t>Create Get &amp; Set actions</a:t>
+            </a:r>
+            <a:endParaRPr lang="en-US" dirty="0">
+              <a:solidFill>
+                <a:prstClr val="black"/>
+              </a:solidFill>
+              <a:latin typeface="Myriad Pro"/>
+            </a:endParaRPr>
+          </a:p>
+        </p:txBody>
+      </p:sp>
+      <p:cxnSp>
+        <p:nvCxnSpPr>
+          <p:cNvPr id="18" name="Straight Connector 17"/>
+          <p:cNvCxnSpPr/>
+          <p:nvPr/>
+        </p:nvCxnSpPr>
+        <p:spPr bwMode="auto">
+          <a:xfrm>
+            <a:off x="1295400" y="2579132"/>
+            <a:ext cx="457200" cy="0"/>
+          </a:xfrm>
+          <a:prstGeom prst="line">
+            <a:avLst/>
+          </a:prstGeom>
+          <a:ln>
+            <a:solidFill>
+              <a:schemeClr val="accent1"/>
+            </a:solidFill>
+            <a:headEnd type="none" w="med" len="med"/>
+            <a:tailEnd type="none" w="med" len="med"/>
+          </a:ln>
+        </p:spPr>
+        <p:style>
+          <a:lnRef idx="2">
+            <a:schemeClr val="accent2"/>
+          </a:lnRef>
+          <a:fillRef idx="0">
+            <a:schemeClr val="accent2"/>
+          </a:fillRef>
+          <a:effectRef idx="1">
+            <a:schemeClr val="accent2"/>
+          </a:effectRef>
+          <a:fontRef idx="minor">
+            <a:schemeClr val="tx1"/>
+          </a:fontRef>
+        </p:style>
+      </p:cxnSp>
+      <p:cxnSp>
+        <p:nvCxnSpPr>
+          <p:cNvPr id="20" name="Straight Connector 19"/>
+          <p:cNvCxnSpPr/>
+          <p:nvPr/>
+        </p:nvCxnSpPr>
+        <p:spPr bwMode="auto">
+          <a:xfrm>
+            <a:off x="1295400" y="2807732"/>
+            <a:ext cx="457200" cy="0"/>
+          </a:xfrm>
+          <a:prstGeom prst="line">
+            <a:avLst/>
+          </a:prstGeom>
+          <a:ln>
+            <a:solidFill>
+              <a:schemeClr val="accent1"/>
+            </a:solidFill>
+            <a:headEnd type="none" w="med" len="med"/>
+            <a:tailEnd type="none" w="med" len="med"/>
+          </a:ln>
+        </p:spPr>
+        <p:style>
+          <a:lnRef idx="2">
+            <a:schemeClr val="accent2"/>
+          </a:lnRef>
+          <a:fillRef idx="0">
+            <a:schemeClr val="accent2"/>
+          </a:fillRef>
+          <a:effectRef idx="1">
+            <a:schemeClr val="accent2"/>
+          </a:effectRef>
+          <a:fontRef idx="minor">
+            <a:schemeClr val="tx1"/>
+          </a:fontRef>
+        </p:style>
+      </p:cxnSp>
+      <p:cxnSp>
+        <p:nvCxnSpPr>
+          <p:cNvPr id="21" name="Straight Arrow Connector 20"/>
+          <p:cNvCxnSpPr/>
+          <p:nvPr/>
+        </p:nvCxnSpPr>
+        <p:spPr bwMode="auto">
+          <a:xfrm flipH="1">
+            <a:off x="4942840" y="3342749"/>
+            <a:ext cx="1066800" cy="11668"/>
+          </a:xfrm>
+          <a:prstGeom prst="straightConnector1">
+            <a:avLst/>
+          </a:prstGeom>
+          <a:ln w="63500">
+            <a:solidFill>
+              <a:schemeClr val="tx1"/>
+            </a:solidFill>
+            <a:headEnd type="none" w="med" len="med"/>
+            <a:tailEnd type="triangle"/>
+          </a:ln>
+        </p:spPr>
+        <p:style>
+          <a:lnRef idx="1">
+            <a:schemeClr val="accent2"/>
+          </a:lnRef>
+          <a:fillRef idx="0">
+            <a:schemeClr val="accent2"/>
+          </a:fillRef>
+          <a:effectRef idx="0">
+            <a:schemeClr val="accent2"/>
+          </a:effectRef>
+          <a:fontRef idx="minor">
+            <a:schemeClr val="tx1"/>
+          </a:fontRef>
+        </p:style>
+      </p:cxnSp>
+      <p:sp>
+        <p:nvSpPr>
+          <p:cNvPr id="22" name="TextBox 21"/>
+          <p:cNvSpPr txBox="1"/>
+          <p:nvPr/>
+        </p:nvSpPr>
+        <p:spPr bwMode="auto">
+          <a:xfrm>
+            <a:off x="6070417" y="3036332"/>
+            <a:ext cx="2961516" cy="646331"/>
+          </a:xfrm>
+          <a:prstGeom prst="rect">
+            <a:avLst/>
+          </a:prstGeom>
+          <a:noFill/>
+          <a:ln w="9525">
+            <a:noFill/>
+            <a:miter lim="800000"/>
+            <a:headEnd/>
+            <a:tailEnd/>
+          </a:ln>
+        </p:spPr>
+        <p:txBody>
+          <a:bodyPr wrap="none" rtlCol="0">
+            <a:spAutoFit/>
+          </a:bodyPr>
+          <a:lstStyle/>
+          <a:p>
+            <a:r>
+              <a:rPr lang="en-US" dirty="0" smtClean="0">
+                <a:solidFill>
+                  <a:prstClr val="black"/>
+                </a:solidFill>
+                <a:latin typeface="Myriad Pro"/>
+              </a:rPr>
+              <a:t>Raise Change Notification to </a:t>
+            </a:r>
+          </a:p>
+          <a:p>
+            <a:r>
+              <a:rPr lang="en-US" dirty="0" smtClean="0">
+                <a:solidFill>
+                  <a:prstClr val="black"/>
+                </a:solidFill>
+                <a:latin typeface="Myriad Pro"/>
+              </a:rPr>
+              <a:t>update the UI</a:t>
+            </a:r>
+            <a:endParaRPr lang="en-US" dirty="0">
+              <a:solidFill>
+                <a:prstClr val="black"/>
+              </a:solidFill>
+              <a:latin typeface="Myriad Pro"/>
+            </a:endParaRPr>
           </a:p>
         </p:txBody>
       </p:sp>
     </p:spTree>
     <p:extLst>
       <p:ext uri="{BB962C8B-B14F-4D97-AF65-F5344CB8AC3E}">
-        <p14:creationId xmlns:p14="http://schemas.microsoft.com/office/powerpoint/2010/main" val="3635652175"/>
+        <p14:creationId xmlns:p14="http://schemas.microsoft.com/office/powerpoint/2010/main" val="1911852489"/>
       </p:ext>
     </p:extLst>
   </p:cSld>
@@ -11097,9 +11184,503 @@
   <p:timing>
     <p:tnLst>
       <p:par>
-        <p:cTn id="1" dur="indefinite" restart="never" nodeType="tmRoot"/>
+        <p:cTn id="1" dur="indefinite" restart="never" nodeType="tmRoot">
+          <p:childTnLst>
+            <p:seq concurrent="1" nextAc="seek">
+              <p:cTn id="2" dur="indefinite" nodeType="mainSeq">
+                <p:childTnLst>
+                  <p:par>
+                    <p:cTn id="3" fill="hold">
+                      <p:stCondLst>
+                        <p:cond delay="indefinite"/>
+                      </p:stCondLst>
+                      <p:childTnLst>
+                        <p:par>
+                          <p:cTn id="4" fill="hold">
+                            <p:stCondLst>
+                              <p:cond delay="0"/>
+                            </p:stCondLst>
+                            <p:childTnLst>
+                              <p:par>
+                                <p:cTn id="5" presetID="1" presetClass="entr" presetSubtype="0" fill="hold" nodeType="clickEffect">
+                                  <p:stCondLst>
+                                    <p:cond delay="0"/>
+                                  </p:stCondLst>
+                                  <p:childTnLst>
+                                    <p:set>
+                                      <p:cBhvr>
+                                        <p:cTn id="6" dur="1" fill="hold">
+                                          <p:stCondLst>
+                                            <p:cond delay="0"/>
+                                          </p:stCondLst>
+                                        </p:cTn>
+                                        <p:tgtEl>
+                                          <p:spTgt spid="10"/>
+                                        </p:tgtEl>
+                                        <p:attrNameLst>
+                                          <p:attrName>style.visibility</p:attrName>
+                                        </p:attrNameLst>
+                                      </p:cBhvr>
+                                      <p:to>
+                                        <p:strVal val="visible"/>
+                                      </p:to>
+                                    </p:set>
+                                  </p:childTnLst>
+                                </p:cTn>
+                              </p:par>
+                              <p:par>
+                                <p:cTn id="7" presetID="1" presetClass="entr" presetSubtype="0" fill="hold" grpId="0" nodeType="withEffect">
+                                  <p:stCondLst>
+                                    <p:cond delay="0"/>
+                                  </p:stCondLst>
+                                  <p:childTnLst>
+                                    <p:set>
+                                      <p:cBhvr>
+                                        <p:cTn id="8" dur="1" fill="hold">
+                                          <p:stCondLst>
+                                            <p:cond delay="0"/>
+                                          </p:stCondLst>
+                                        </p:cTn>
+                                        <p:tgtEl>
+                                          <p:spTgt spid="12"/>
+                                        </p:tgtEl>
+                                        <p:attrNameLst>
+                                          <p:attrName>style.visibility</p:attrName>
+                                        </p:attrNameLst>
+                                      </p:cBhvr>
+                                      <p:to>
+                                        <p:strVal val="visible"/>
+                                      </p:to>
+                                    </p:set>
+                                  </p:childTnLst>
+                                </p:cTn>
+                              </p:par>
+                            </p:childTnLst>
+                          </p:cTn>
+                        </p:par>
+                      </p:childTnLst>
+                    </p:cTn>
+                  </p:par>
+                  <p:par>
+                    <p:cTn id="9" fill="hold">
+                      <p:stCondLst>
+                        <p:cond delay="indefinite"/>
+                      </p:stCondLst>
+                      <p:childTnLst>
+                        <p:par>
+                          <p:cTn id="10" fill="hold">
+                            <p:stCondLst>
+                              <p:cond delay="0"/>
+                            </p:stCondLst>
+                            <p:childTnLst>
+                              <p:par>
+                                <p:cTn id="11" presetID="1" presetClass="entr" presetSubtype="0" fill="hold" nodeType="clickEffect">
+                                  <p:stCondLst>
+                                    <p:cond delay="0"/>
+                                  </p:stCondLst>
+                                  <p:childTnLst>
+                                    <p:set>
+                                      <p:cBhvr>
+                                        <p:cTn id="12" dur="1" fill="hold">
+                                          <p:stCondLst>
+                                            <p:cond delay="0"/>
+                                          </p:stCondLst>
+                                        </p:cTn>
+                                        <p:tgtEl>
+                                          <p:spTgt spid="14"/>
+                                        </p:tgtEl>
+                                        <p:attrNameLst>
+                                          <p:attrName>style.visibility</p:attrName>
+                                        </p:attrNameLst>
+                                      </p:cBhvr>
+                                      <p:to>
+                                        <p:strVal val="visible"/>
+                                      </p:to>
+                                    </p:set>
+                                  </p:childTnLst>
+                                </p:cTn>
+                              </p:par>
+                              <p:par>
+                                <p:cTn id="13" presetID="1" presetClass="entr" presetSubtype="0" fill="hold" grpId="0" nodeType="withEffect">
+                                  <p:stCondLst>
+                                    <p:cond delay="0"/>
+                                  </p:stCondLst>
+                                  <p:childTnLst>
+                                    <p:set>
+                                      <p:cBhvr>
+                                        <p:cTn id="14" dur="1" fill="hold">
+                                          <p:stCondLst>
+                                            <p:cond delay="0"/>
+                                          </p:stCondLst>
+                                        </p:cTn>
+                                        <p:tgtEl>
+                                          <p:spTgt spid="16"/>
+                                        </p:tgtEl>
+                                        <p:attrNameLst>
+                                          <p:attrName>style.visibility</p:attrName>
+                                        </p:attrNameLst>
+                                      </p:cBhvr>
+                                      <p:to>
+                                        <p:strVal val="visible"/>
+                                      </p:to>
+                                    </p:set>
+                                  </p:childTnLst>
+                                </p:cTn>
+                              </p:par>
+                              <p:par>
+                                <p:cTn id="15" presetID="10" presetClass="exit" presetSubtype="0" fill="hold" nodeType="withEffect">
+                                  <p:stCondLst>
+                                    <p:cond delay="0"/>
+                                  </p:stCondLst>
+                                  <p:childTnLst>
+                                    <p:animEffect transition="out" filter="fade">
+                                      <p:cBhvr>
+                                        <p:cTn id="16" dur="500"/>
+                                        <p:tgtEl>
+                                          <p:spTgt spid="10"/>
+                                        </p:tgtEl>
+                                      </p:cBhvr>
+                                    </p:animEffect>
+                                    <p:set>
+                                      <p:cBhvr>
+                                        <p:cTn id="17" dur="1" fill="hold">
+                                          <p:stCondLst>
+                                            <p:cond delay="499"/>
+                                          </p:stCondLst>
+                                        </p:cTn>
+                                        <p:tgtEl>
+                                          <p:spTgt spid="10"/>
+                                        </p:tgtEl>
+                                        <p:attrNameLst>
+                                          <p:attrName>style.visibility</p:attrName>
+                                        </p:attrNameLst>
+                                      </p:cBhvr>
+                                      <p:to>
+                                        <p:strVal val="hidden"/>
+                                      </p:to>
+                                    </p:set>
+                                  </p:childTnLst>
+                                </p:cTn>
+                              </p:par>
+                              <p:par>
+                                <p:cTn id="18" presetID="10" presetClass="exit" presetSubtype="0" fill="hold" grpId="1" nodeType="withEffect">
+                                  <p:stCondLst>
+                                    <p:cond delay="0"/>
+                                  </p:stCondLst>
+                                  <p:childTnLst>
+                                    <p:animEffect transition="out" filter="fade">
+                                      <p:cBhvr>
+                                        <p:cTn id="19" dur="500"/>
+                                        <p:tgtEl>
+                                          <p:spTgt spid="12"/>
+                                        </p:tgtEl>
+                                      </p:cBhvr>
+                                    </p:animEffect>
+                                    <p:set>
+                                      <p:cBhvr>
+                                        <p:cTn id="20" dur="1" fill="hold">
+                                          <p:stCondLst>
+                                            <p:cond delay="499"/>
+                                          </p:stCondLst>
+                                        </p:cTn>
+                                        <p:tgtEl>
+                                          <p:spTgt spid="12"/>
+                                        </p:tgtEl>
+                                        <p:attrNameLst>
+                                          <p:attrName>style.visibility</p:attrName>
+                                        </p:attrNameLst>
+                                      </p:cBhvr>
+                                      <p:to>
+                                        <p:strVal val="hidden"/>
+                                      </p:to>
+                                    </p:set>
+                                  </p:childTnLst>
+                                </p:cTn>
+                              </p:par>
+                              <p:par>
+                                <p:cTn id="21" presetID="1" presetClass="entr" presetSubtype="0" fill="hold" nodeType="withEffect">
+                                  <p:stCondLst>
+                                    <p:cond delay="0"/>
+                                  </p:stCondLst>
+                                  <p:childTnLst>
+                                    <p:set>
+                                      <p:cBhvr>
+                                        <p:cTn id="22" dur="1" fill="hold">
+                                          <p:stCondLst>
+                                            <p:cond delay="0"/>
+                                          </p:stCondLst>
+                                        </p:cTn>
+                                        <p:tgtEl>
+                                          <p:spTgt spid="18"/>
+                                        </p:tgtEl>
+                                        <p:attrNameLst>
+                                          <p:attrName>style.visibility</p:attrName>
+                                        </p:attrNameLst>
+                                      </p:cBhvr>
+                                      <p:to>
+                                        <p:strVal val="visible"/>
+                                      </p:to>
+                                    </p:set>
+                                  </p:childTnLst>
+                                </p:cTn>
+                              </p:par>
+                              <p:par>
+                                <p:cTn id="23" presetID="1" presetClass="entr" presetSubtype="0" fill="hold" nodeType="withEffect">
+                                  <p:stCondLst>
+                                    <p:cond delay="0"/>
+                                  </p:stCondLst>
+                                  <p:childTnLst>
+                                    <p:set>
+                                      <p:cBhvr>
+                                        <p:cTn id="24" dur="1" fill="hold">
+                                          <p:stCondLst>
+                                            <p:cond delay="0"/>
+                                          </p:stCondLst>
+                                        </p:cTn>
+                                        <p:tgtEl>
+                                          <p:spTgt spid="20"/>
+                                        </p:tgtEl>
+                                        <p:attrNameLst>
+                                          <p:attrName>style.visibility</p:attrName>
+                                        </p:attrNameLst>
+                                      </p:cBhvr>
+                                      <p:to>
+                                        <p:strVal val="visible"/>
+                                      </p:to>
+                                    </p:set>
+                                  </p:childTnLst>
+                                </p:cTn>
+                              </p:par>
+                            </p:childTnLst>
+                          </p:cTn>
+                        </p:par>
+                      </p:childTnLst>
+                    </p:cTn>
+                  </p:par>
+                  <p:par>
+                    <p:cTn id="25" fill="hold">
+                      <p:stCondLst>
+                        <p:cond delay="indefinite"/>
+                      </p:stCondLst>
+                      <p:childTnLst>
+                        <p:par>
+                          <p:cTn id="26" fill="hold">
+                            <p:stCondLst>
+                              <p:cond delay="0"/>
+                            </p:stCondLst>
+                            <p:childTnLst>
+                              <p:par>
+                                <p:cTn id="27" presetID="1" presetClass="entr" presetSubtype="0" fill="hold" nodeType="clickEffect">
+                                  <p:stCondLst>
+                                    <p:cond delay="0"/>
+                                  </p:stCondLst>
+                                  <p:childTnLst>
+                                    <p:set>
+                                      <p:cBhvr>
+                                        <p:cTn id="28" dur="1" fill="hold">
+                                          <p:stCondLst>
+                                            <p:cond delay="0"/>
+                                          </p:stCondLst>
+                                        </p:cTn>
+                                        <p:tgtEl>
+                                          <p:spTgt spid="21"/>
+                                        </p:tgtEl>
+                                        <p:attrNameLst>
+                                          <p:attrName>style.visibility</p:attrName>
+                                        </p:attrNameLst>
+                                      </p:cBhvr>
+                                      <p:to>
+                                        <p:strVal val="visible"/>
+                                      </p:to>
+                                    </p:set>
+                                  </p:childTnLst>
+                                </p:cTn>
+                              </p:par>
+                              <p:par>
+                                <p:cTn id="29" presetID="1" presetClass="entr" presetSubtype="0" fill="hold" grpId="0" nodeType="withEffect">
+                                  <p:stCondLst>
+                                    <p:cond delay="0"/>
+                                  </p:stCondLst>
+                                  <p:childTnLst>
+                                    <p:set>
+                                      <p:cBhvr>
+                                        <p:cTn id="30" dur="1" fill="hold">
+                                          <p:stCondLst>
+                                            <p:cond delay="0"/>
+                                          </p:stCondLst>
+                                        </p:cTn>
+                                        <p:tgtEl>
+                                          <p:spTgt spid="22"/>
+                                        </p:tgtEl>
+                                        <p:attrNameLst>
+                                          <p:attrName>style.visibility</p:attrName>
+                                        </p:attrNameLst>
+                                      </p:cBhvr>
+                                      <p:to>
+                                        <p:strVal val="visible"/>
+                                      </p:to>
+                                    </p:set>
+                                  </p:childTnLst>
+                                </p:cTn>
+                              </p:par>
+                              <p:par>
+                                <p:cTn id="31" presetID="10" presetClass="exit" presetSubtype="0" fill="hold" nodeType="withEffect">
+                                  <p:stCondLst>
+                                    <p:cond delay="0"/>
+                                  </p:stCondLst>
+                                  <p:childTnLst>
+                                    <p:animEffect transition="out" filter="fade">
+                                      <p:cBhvr>
+                                        <p:cTn id="32" dur="500"/>
+                                        <p:tgtEl>
+                                          <p:spTgt spid="14"/>
+                                        </p:tgtEl>
+                                      </p:cBhvr>
+                                    </p:animEffect>
+                                    <p:set>
+                                      <p:cBhvr>
+                                        <p:cTn id="33" dur="1" fill="hold">
+                                          <p:stCondLst>
+                                            <p:cond delay="499"/>
+                                          </p:stCondLst>
+                                        </p:cTn>
+                                        <p:tgtEl>
+                                          <p:spTgt spid="14"/>
+                                        </p:tgtEl>
+                                        <p:attrNameLst>
+                                          <p:attrName>style.visibility</p:attrName>
+                                        </p:attrNameLst>
+                                      </p:cBhvr>
+                                      <p:to>
+                                        <p:strVal val="hidden"/>
+                                      </p:to>
+                                    </p:set>
+                                  </p:childTnLst>
+                                </p:cTn>
+                              </p:par>
+                              <p:par>
+                                <p:cTn id="34" presetID="10" presetClass="exit" presetSubtype="0" fill="hold" grpId="1" nodeType="withEffect">
+                                  <p:stCondLst>
+                                    <p:cond delay="0"/>
+                                  </p:stCondLst>
+                                  <p:childTnLst>
+                                    <p:animEffect transition="out" filter="fade">
+                                      <p:cBhvr>
+                                        <p:cTn id="35" dur="500"/>
+                                        <p:tgtEl>
+                                          <p:spTgt spid="16"/>
+                                        </p:tgtEl>
+                                      </p:cBhvr>
+                                    </p:animEffect>
+                                    <p:set>
+                                      <p:cBhvr>
+                                        <p:cTn id="36" dur="1" fill="hold">
+                                          <p:stCondLst>
+                                            <p:cond delay="499"/>
+                                          </p:stCondLst>
+                                        </p:cTn>
+                                        <p:tgtEl>
+                                          <p:spTgt spid="16"/>
+                                        </p:tgtEl>
+                                        <p:attrNameLst>
+                                          <p:attrName>style.visibility</p:attrName>
+                                        </p:attrNameLst>
+                                      </p:cBhvr>
+                                      <p:to>
+                                        <p:strVal val="hidden"/>
+                                      </p:to>
+                                    </p:set>
+                                  </p:childTnLst>
+                                </p:cTn>
+                              </p:par>
+                              <p:par>
+                                <p:cTn id="37" presetID="1" presetClass="exit" presetSubtype="0" fill="hold" nodeType="withEffect">
+                                  <p:stCondLst>
+                                    <p:cond delay="0"/>
+                                  </p:stCondLst>
+                                  <p:childTnLst>
+                                    <p:set>
+                                      <p:cBhvr>
+                                        <p:cTn id="38" dur="1" fill="hold">
+                                          <p:stCondLst>
+                                            <p:cond delay="0"/>
+                                          </p:stCondLst>
+                                        </p:cTn>
+                                        <p:tgtEl>
+                                          <p:spTgt spid="18"/>
+                                        </p:tgtEl>
+                                        <p:attrNameLst>
+                                          <p:attrName>style.visibility</p:attrName>
+                                        </p:attrNameLst>
+                                      </p:cBhvr>
+                                      <p:to>
+                                        <p:strVal val="hidden"/>
+                                      </p:to>
+                                    </p:set>
+                                  </p:childTnLst>
+                                </p:cTn>
+                              </p:par>
+                              <p:par>
+                                <p:cTn id="39" presetID="1" presetClass="exit" presetSubtype="0" fill="hold" nodeType="withEffect">
+                                  <p:stCondLst>
+                                    <p:cond delay="0"/>
+                                  </p:stCondLst>
+                                  <p:childTnLst>
+                                    <p:set>
+                                      <p:cBhvr>
+                                        <p:cTn id="40" dur="1" fill="hold">
+                                          <p:stCondLst>
+                                            <p:cond delay="0"/>
+                                          </p:stCondLst>
+                                        </p:cTn>
+                                        <p:tgtEl>
+                                          <p:spTgt spid="20"/>
+                                        </p:tgtEl>
+                                        <p:attrNameLst>
+                                          <p:attrName>style.visibility</p:attrName>
+                                        </p:attrNameLst>
+                                      </p:cBhvr>
+                                      <p:to>
+                                        <p:strVal val="hidden"/>
+                                      </p:to>
+                                    </p:set>
+                                  </p:childTnLst>
+                                </p:cTn>
+                              </p:par>
+                            </p:childTnLst>
+                          </p:cTn>
+                        </p:par>
+                      </p:childTnLst>
+                    </p:cTn>
+                  </p:par>
+                </p:childTnLst>
+              </p:cTn>
+              <p:prevCondLst>
+                <p:cond evt="onPrev" delay="0">
+                  <p:tgtEl>
+                    <p:sldTgt/>
+                  </p:tgtEl>
+                </p:cond>
+              </p:prevCondLst>
+              <p:nextCondLst>
+                <p:cond evt="onNext" delay="0">
+                  <p:tgtEl>
+                    <p:sldTgt/>
+                  </p:tgtEl>
+                </p:cond>
+              </p:nextCondLst>
+            </p:seq>
+          </p:childTnLst>
+        </p:cTn>
       </p:par>
     </p:tnLst>
+    <p:bldLst>
+      <p:bldP spid="12" grpId="0"/>
+      <p:bldP spid="12" grpId="1"/>
+      <p:bldP spid="16" grpId="0"/>
+      <p:bldP spid="16" grpId="1"/>
+      <p:bldP spid="22" grpId="0"/>
+    </p:bldLst>
   </p:timing>
 </p:sld>
 </file>
@@ -11508,6 +12089,30 @@
           <a:chExt cx="0" cy="0"/>
         </a:xfrm>
       </p:grpSpPr>
+      <p:pic>
+        <p:nvPicPr>
+          <p:cNvPr id="3" name="Picture 2"/>
+          <p:cNvPicPr>
+            <a:picLocks noChangeAspect="1"/>
+          </p:cNvPicPr>
+          <p:nvPr/>
+        </p:nvPicPr>
+        <p:blipFill>
+          <a:blip r:embed="rId3"/>
+          <a:stretch>
+            <a:fillRect/>
+          </a:stretch>
+        </p:blipFill>
+        <p:spPr>
+          <a:xfrm>
+            <a:off x="858745" y="1731477"/>
+            <a:ext cx="8010525" cy="590550"/>
+          </a:xfrm>
+          <a:prstGeom prst="rect">
+            <a:avLst/>
+          </a:prstGeom>
+        </p:spPr>
+      </p:pic>
       <p:sp>
         <p:nvSpPr>
           <p:cNvPr id="2" name="Title 1"/>
@@ -11525,75 +12130,228 @@
           <a:p>
             <a:r>
               <a:rPr lang="en-US" dirty="0" smtClean="0"/>
-              <a:t>Agenda		</a:t>
+              <a:t>Observable Properties		 -- Knockout Way</a:t>
             </a:r>
             <a:endParaRPr lang="en-GB" dirty="0"/>
+          </a:p>
+        </p:txBody>
+      </p:sp>
+      <p:cxnSp>
+        <p:nvCxnSpPr>
+          <p:cNvPr id="10" name="Straight Arrow Connector 9"/>
+          <p:cNvCxnSpPr/>
+          <p:nvPr/>
+        </p:nvCxnSpPr>
+        <p:spPr bwMode="auto">
+          <a:xfrm flipV="1">
+            <a:off x="2057400" y="2211417"/>
+            <a:ext cx="0" cy="1143000"/>
+          </a:xfrm>
+          <a:prstGeom prst="straightConnector1">
+            <a:avLst/>
+          </a:prstGeom>
+          <a:ln w="63500">
+            <a:solidFill>
+              <a:schemeClr val="tx1"/>
+            </a:solidFill>
+            <a:headEnd type="none" w="med" len="med"/>
+            <a:tailEnd type="triangle"/>
+          </a:ln>
+        </p:spPr>
+        <p:style>
+          <a:lnRef idx="1">
+            <a:schemeClr val="accent2"/>
+          </a:lnRef>
+          <a:fillRef idx="0">
+            <a:schemeClr val="accent2"/>
+          </a:fillRef>
+          <a:effectRef idx="0">
+            <a:schemeClr val="accent2"/>
+          </a:effectRef>
+          <a:fontRef idx="minor">
+            <a:schemeClr val="tx1"/>
+          </a:fontRef>
+        </p:style>
+      </p:cxnSp>
+      <p:sp>
+        <p:nvSpPr>
+          <p:cNvPr id="12" name="TextBox 11"/>
+          <p:cNvSpPr txBox="1"/>
+          <p:nvPr/>
+        </p:nvSpPr>
+        <p:spPr bwMode="auto">
+          <a:xfrm>
+            <a:off x="990600" y="3511191"/>
+            <a:ext cx="2175724" cy="369332"/>
+          </a:xfrm>
+          <a:prstGeom prst="rect">
+            <a:avLst/>
+          </a:prstGeom>
+          <a:noFill/>
+          <a:ln w="9525">
+            <a:noFill/>
+            <a:miter lim="800000"/>
+            <a:headEnd/>
+            <a:tailEnd/>
+          </a:ln>
+        </p:spPr>
+        <p:txBody>
+          <a:bodyPr wrap="none" rtlCol="0">
+            <a:spAutoFit/>
+          </a:bodyPr>
+          <a:lstStyle/>
+          <a:p>
+            <a:r>
+              <a:rPr lang="en-US" dirty="0" smtClean="0">
+                <a:solidFill>
+                  <a:prstClr val="black"/>
+                </a:solidFill>
+                <a:latin typeface="Myriad Pro"/>
+              </a:rPr>
+              <a:t>Declare our Property</a:t>
+            </a:r>
+            <a:endParaRPr lang="en-US" dirty="0">
+              <a:solidFill>
+                <a:prstClr val="black"/>
+              </a:solidFill>
+              <a:latin typeface="Myriad Pro"/>
+            </a:endParaRPr>
+          </a:p>
+        </p:txBody>
+      </p:sp>
+      <p:cxnSp>
+        <p:nvCxnSpPr>
+          <p:cNvPr id="14" name="Straight Arrow Connector 13"/>
+          <p:cNvCxnSpPr/>
+          <p:nvPr/>
+        </p:nvCxnSpPr>
+        <p:spPr bwMode="auto">
+          <a:xfrm flipV="1">
+            <a:off x="6823792" y="2322027"/>
+            <a:ext cx="0" cy="1142999"/>
+          </a:xfrm>
+          <a:prstGeom prst="straightConnector1">
+            <a:avLst/>
+          </a:prstGeom>
+          <a:ln w="63500">
+            <a:solidFill>
+              <a:schemeClr val="tx1"/>
+            </a:solidFill>
+            <a:headEnd type="none" w="med" len="med"/>
+            <a:tailEnd type="triangle"/>
+          </a:ln>
+        </p:spPr>
+        <p:style>
+          <a:lnRef idx="1">
+            <a:schemeClr val="accent2"/>
+          </a:lnRef>
+          <a:fillRef idx="0">
+            <a:schemeClr val="accent2"/>
+          </a:fillRef>
+          <a:effectRef idx="0">
+            <a:schemeClr val="accent2"/>
+          </a:effectRef>
+          <a:fontRef idx="minor">
+            <a:schemeClr val="tx1"/>
+          </a:fontRef>
+        </p:style>
+      </p:cxnSp>
+      <p:sp>
+        <p:nvSpPr>
+          <p:cNvPr id="16" name="TextBox 15"/>
+          <p:cNvSpPr txBox="1"/>
+          <p:nvPr/>
+        </p:nvSpPr>
+        <p:spPr bwMode="auto">
+          <a:xfrm>
+            <a:off x="5410200" y="3515227"/>
+            <a:ext cx="2827184" cy="369332"/>
+          </a:xfrm>
+          <a:prstGeom prst="rect">
+            <a:avLst/>
+          </a:prstGeom>
+          <a:noFill/>
+          <a:ln w="9525">
+            <a:noFill/>
+            <a:miter lim="800000"/>
+            <a:headEnd/>
+            <a:tailEnd/>
+          </a:ln>
+        </p:spPr>
+        <p:txBody>
+          <a:bodyPr wrap="none" rtlCol="0">
+            <a:spAutoFit/>
+          </a:bodyPr>
+          <a:lstStyle/>
+          <a:p>
+            <a:r>
+              <a:rPr lang="en-US" dirty="0" smtClean="0">
+                <a:solidFill>
+                  <a:prstClr val="black"/>
+                </a:solidFill>
+                <a:latin typeface="Myriad Pro"/>
+              </a:rPr>
+              <a:t>Initialize it as an observable</a:t>
+            </a:r>
+            <a:endParaRPr lang="en-US" dirty="0">
+              <a:solidFill>
+                <a:prstClr val="black"/>
+              </a:solidFill>
+              <a:latin typeface="Myriad Pro"/>
+            </a:endParaRPr>
           </a:p>
         </p:txBody>
       </p:sp>
       <p:sp>
         <p:nvSpPr>
-          <p:cNvPr id="3" name="Text Placeholder 2"/>
-          <p:cNvSpPr>
-            <a:spLocks noGrp="1"/>
-          </p:cNvSpPr>
-          <p:nvPr>
-            <p:ph type="body" idx="1"/>
-          </p:nvPr>
+          <p:cNvPr id="17" name="TextBox 16"/>
+          <p:cNvSpPr txBox="1"/>
+          <p:nvPr/>
         </p:nvSpPr>
-        <p:spPr/>
+        <p:spPr bwMode="auto">
+          <a:xfrm>
+            <a:off x="1690025" y="4738754"/>
+            <a:ext cx="5763950" cy="369332"/>
+          </a:xfrm>
+          <a:prstGeom prst="rect">
+            <a:avLst/>
+          </a:prstGeom>
+          <a:noFill/>
+          <a:ln w="9525">
+            <a:noFill/>
+            <a:miter lim="800000"/>
+            <a:headEnd/>
+            <a:tailEnd/>
+          </a:ln>
+        </p:spPr>
         <p:txBody>
-          <a:bodyPr/>
+          <a:bodyPr wrap="none" rtlCol="0">
+            <a:spAutoFit/>
+          </a:bodyPr>
           <a:lstStyle/>
           <a:p>
             <a:r>
               <a:rPr lang="en-US" dirty="0" smtClean="0">
-                <a:latin typeface="+mn-lt"/>
+                <a:solidFill>
+                  <a:srgbClr val="CC3300"/>
+                </a:solidFill>
+                <a:latin typeface="Myriad Pro"/>
               </a:rPr>
-              <a:t>Learn about Knockout.js</a:t>
-            </a:r>
-          </a:p>
-          <a:p>
-            <a:r>
-              <a:rPr lang="en-GB" dirty="0" smtClean="0"/>
-              <a:t>Learn about Typescript</a:t>
-            </a:r>
-          </a:p>
-          <a:p>
-            <a:r>
-              <a:rPr lang="en-GB" dirty="0" smtClean="0"/>
-              <a:t>Introduction to Context Binding</a:t>
-            </a:r>
-          </a:p>
-          <a:p>
-            <a:r>
-              <a:rPr lang="en-GB" dirty="0" smtClean="0"/>
-              <a:t>Introduction to Observable Properties</a:t>
-            </a:r>
-          </a:p>
-          <a:p>
-            <a:r>
-              <a:rPr lang="en-GB" dirty="0" smtClean="0">
-                <a:solidFill>
-                  <a:srgbClr val="EF8B19"/>
-                </a:solidFill>
-              </a:rPr>
-              <a:t>Introduction to Observable Arrays</a:t>
-            </a:r>
-          </a:p>
-          <a:p>
-            <a:r>
-              <a:rPr lang="en-GB" dirty="0" smtClean="0"/>
-              <a:t>Introduction to Computed Observables</a:t>
-            </a:r>
-            <a:endParaRPr lang="en-GB" dirty="0"/>
+              <a:t>Did you notice there is no direct need to raise notification?</a:t>
+            </a:r>
+            <a:endParaRPr lang="en-US" dirty="0">
+              <a:solidFill>
+                <a:srgbClr val="CC3300"/>
+              </a:solidFill>
+              <a:latin typeface="Myriad Pro"/>
+            </a:endParaRPr>
           </a:p>
         </p:txBody>
       </p:sp>
     </p:spTree>
     <p:extLst>
       <p:ext uri="{BB962C8B-B14F-4D97-AF65-F5344CB8AC3E}">
-        <p14:creationId xmlns:p14="http://schemas.microsoft.com/office/powerpoint/2010/main" val="466631671"/>
+        <p14:creationId xmlns:p14="http://schemas.microsoft.com/office/powerpoint/2010/main" val="2596127602"/>
       </p:ext>
     </p:extLst>
   </p:cSld>
@@ -11624,7 +12382,7 @@
                             </p:stCondLst>
                             <p:childTnLst>
                               <p:par>
-                                <p:cTn id="5" presetID="10" presetClass="entr" presetSubtype="0" fill="hold" grpId="0" nodeType="clickEffect">
+                                <p:cTn id="5" presetID="1" presetClass="entr" presetSubtype="0" fill="hold" nodeType="clickEffect">
                                   <p:stCondLst>
                                     <p:cond delay="0"/>
                                   </p:stCondLst>
@@ -11637,11 +12395,7 @@
                                           </p:stCondLst>
                                         </p:cTn>
                                         <p:tgtEl>
-                                          <p:spTgt spid="3">
-                                            <p:txEl>
-                                              <p:pRg st="0" end="0"/>
-                                            </p:txEl>
-                                          </p:spTgt>
+                                          <p:spTgt spid="10"/>
                                         </p:tgtEl>
                                         <p:attrNameLst>
                                           <p:attrName>style.visibility</p:attrName>
@@ -11651,18 +12405,33 @@
                                         <p:strVal val="visible"/>
                                       </p:to>
                                     </p:set>
-                                    <p:animEffect transition="in" filter="fade">
+                                  </p:childTnLst>
+                                </p:cTn>
+                              </p:par>
+                              <p:par>
+                                <p:cTn id="7" presetID="1" presetClass="entr" presetSubtype="0" fill="hold" grpId="0" nodeType="withEffect">
+                                  <p:stCondLst>
+                                    <p:cond delay="0"/>
+                                  </p:stCondLst>
+                                  <p:childTnLst>
+                                    <p:set>
                                       <p:cBhvr>
-                                        <p:cTn id="7" dur="500"/>
+                                        <p:cTn id="8" dur="1" fill="hold">
+                                          <p:stCondLst>
+                                            <p:cond delay="0"/>
+                                          </p:stCondLst>
+                                        </p:cTn>
                                         <p:tgtEl>
-                                          <p:spTgt spid="3">
-                                            <p:txEl>
-                                              <p:pRg st="0" end="0"/>
-                                            </p:txEl>
-                                          </p:spTgt>
+                                          <p:spTgt spid="12"/>
                                         </p:tgtEl>
+                                        <p:attrNameLst>
+                                          <p:attrName>style.visibility</p:attrName>
+                                        </p:attrNameLst>
                                       </p:cBhvr>
-                                    </p:animEffect>
+                                      <p:to>
+                                        <p:strVal val="visible"/>
+                                      </p:to>
+                                    </p:set>
                                   </p:childTnLst>
                                 </p:cTn>
                               </p:par>
@@ -11673,36 +12442,32 @@
                     </p:cTn>
                   </p:par>
                   <p:par>
-                    <p:cTn id="8" fill="hold">
+                    <p:cTn id="9" fill="hold">
                       <p:stCondLst>
                         <p:cond delay="indefinite"/>
                       </p:stCondLst>
                       <p:childTnLst>
                         <p:par>
-                          <p:cTn id="9" fill="hold">
+                          <p:cTn id="10" fill="hold">
                             <p:stCondLst>
                               <p:cond delay="0"/>
                             </p:stCondLst>
                             <p:childTnLst>
                               <p:par>
-                                <p:cTn id="10" presetID="10" presetClass="entr" presetSubtype="0" fill="hold" grpId="0" nodeType="clickEffect">
+                                <p:cTn id="11" presetID="1" presetClass="entr" presetSubtype="0" fill="hold" nodeType="clickEffect">
                                   <p:stCondLst>
                                     <p:cond delay="0"/>
                                   </p:stCondLst>
                                   <p:childTnLst>
                                     <p:set>
                                       <p:cBhvr>
-                                        <p:cTn id="11" dur="1" fill="hold">
+                                        <p:cTn id="12" dur="1" fill="hold">
                                           <p:stCondLst>
                                             <p:cond delay="0"/>
                                           </p:stCondLst>
                                         </p:cTn>
                                         <p:tgtEl>
-                                          <p:spTgt spid="3">
-                                            <p:txEl>
-                                              <p:pRg st="1" end="1"/>
-                                            </p:txEl>
-                                          </p:spTgt>
+                                          <p:spTgt spid="14"/>
                                         </p:tgtEl>
                                         <p:attrNameLst>
                                           <p:attrName>style.visibility</p:attrName>
@@ -11712,18 +12477,103 @@
                                         <p:strVal val="visible"/>
                                       </p:to>
                                     </p:set>
-                                    <p:animEffect transition="in" filter="fade">
+                                  </p:childTnLst>
+                                </p:cTn>
+                              </p:par>
+                              <p:par>
+                                <p:cTn id="13" presetID="1" presetClass="entr" presetSubtype="0" fill="hold" grpId="0" nodeType="withEffect">
+                                  <p:stCondLst>
+                                    <p:cond delay="0"/>
+                                  </p:stCondLst>
+                                  <p:childTnLst>
+                                    <p:set>
                                       <p:cBhvr>
-                                        <p:cTn id="12" dur="500"/>
+                                        <p:cTn id="14" dur="1" fill="hold">
+                                          <p:stCondLst>
+                                            <p:cond delay="0"/>
+                                          </p:stCondLst>
+                                        </p:cTn>
                                         <p:tgtEl>
-                                          <p:spTgt spid="3">
-                                            <p:txEl>
-                                              <p:pRg st="1" end="1"/>
-                                            </p:txEl>
-                                          </p:spTgt>
+                                          <p:spTgt spid="16"/>
+                                        </p:tgtEl>
+                                        <p:attrNameLst>
+                                          <p:attrName>style.visibility</p:attrName>
+                                        </p:attrNameLst>
+                                      </p:cBhvr>
+                                      <p:to>
+                                        <p:strVal val="visible"/>
+                                      </p:to>
+                                    </p:set>
+                                  </p:childTnLst>
+                                </p:cTn>
+                              </p:par>
+                              <p:par>
+                                <p:cTn id="15" presetID="10" presetClass="exit" presetSubtype="0" fill="hold" nodeType="withEffect">
+                                  <p:stCondLst>
+                                    <p:cond delay="0"/>
+                                  </p:stCondLst>
+                                  <p:childTnLst>
+                                    <p:animEffect transition="out" filter="fade">
+                                      <p:cBhvr>
+                                        <p:cTn id="16" dur="500"/>
+                                        <p:tgtEl>
+                                          <p:spTgt spid="10"/>
                                         </p:tgtEl>
                                       </p:cBhvr>
                                     </p:animEffect>
+                                    <p:set>
+                                      <p:cBhvr>
+                                        <p:cTn id="17" dur="1" fill="hold">
+                                          <p:stCondLst>
+                                            <p:cond delay="499"/>
+                                          </p:stCondLst>
+                                        </p:cTn>
+                                        <p:tgtEl>
+                                          <p:spTgt spid="10"/>
+                                        </p:tgtEl>
+                                        <p:attrNameLst>
+                                          <p:attrName>style.visibility</p:attrName>
+                                        </p:attrNameLst>
+                                      </p:cBhvr>
+                                      <p:to>
+                                        <p:strVal val="hidden"/>
+                                      </p:to>
+                                    </p:set>
+                                  </p:childTnLst>
+                                </p:cTn>
+                              </p:par>
+                              <p:par>
+                                <p:cTn id="18" presetID="10" presetClass="exit" presetSubtype="0" fill="hold" grpId="1" nodeType="withEffect">
+                                  <p:stCondLst>
+                                    <p:cond delay="0"/>
+                                  </p:stCondLst>
+                                  <p:childTnLst>
+                                    <p:animEffect transition="out" filter="fade">
+                                      <p:cBhvr>
+                                        <p:cTn id="19" dur="500"/>
+                                        <p:tgtEl>
+                                          <p:spTgt spid="12"/>
+                                        </p:tgtEl>
+                                      </p:cBhvr>
+                                    </p:animEffect>
+                                    <p:set>
+                                      <p:cBhvr>
+                                        <p:cTn id="20" dur="1" fill="hold">
+                                          <p:stCondLst>
+                                            <p:cond delay="499"/>
+                                          </p:stCondLst>
+                                        </p:cTn>
+                                        <p:tgtEl>
+                                          <p:spTgt spid="12"/>
+                                        </p:tgtEl>
+                                        <p:attrNameLst>
+                                          <p:attrName>style.visibility</p:attrName>
+                                        </p:attrNameLst>
+                                      </p:cBhvr>
+                                      <p:to>
+                                        <p:strVal val="hidden"/>
+                                      </p:to>
+                                    </p:set>
                                   </p:childTnLst>
                                 </p:cTn>
                               </p:par>
@@ -11734,36 +12584,32 @@
                     </p:cTn>
                   </p:par>
                   <p:par>
-                    <p:cTn id="13" fill="hold">
+                    <p:cTn id="21" fill="hold">
                       <p:stCondLst>
                         <p:cond delay="indefinite"/>
                       </p:stCondLst>
                       <p:childTnLst>
                         <p:par>
-                          <p:cTn id="14" fill="hold">
+                          <p:cTn id="22" fill="hold">
                             <p:stCondLst>
                               <p:cond delay="0"/>
                             </p:stCondLst>
                             <p:childTnLst>
                               <p:par>
-                                <p:cTn id="15" presetID="10" presetClass="entr" presetSubtype="0" fill="hold" grpId="0" nodeType="clickEffect">
+                                <p:cTn id="23" presetID="1" presetClass="entr" presetSubtype="0" fill="hold" grpId="0" nodeType="clickEffect">
                                   <p:stCondLst>
                                     <p:cond delay="0"/>
                                   </p:stCondLst>
                                   <p:childTnLst>
                                     <p:set>
                                       <p:cBhvr>
-                                        <p:cTn id="16" dur="1" fill="hold">
+                                        <p:cTn id="24" dur="1" fill="hold">
                                           <p:stCondLst>
                                             <p:cond delay="0"/>
                                           </p:stCondLst>
                                         </p:cTn>
                                         <p:tgtEl>
-                                          <p:spTgt spid="3">
-                                            <p:txEl>
-                                              <p:pRg st="2" end="2"/>
-                                            </p:txEl>
-                                          </p:spTgt>
+                                          <p:spTgt spid="17"/>
                                         </p:tgtEl>
                                         <p:attrNameLst>
                                           <p:attrName>style.visibility</p:attrName>
@@ -11773,201 +12619,76 @@
                                         <p:strVal val="visible"/>
                                       </p:to>
                                     </p:set>
-                                    <p:animEffect transition="in" filter="fade">
-                                      <p:cBhvr>
-                                        <p:cTn id="17" dur="500"/>
-                                        <p:tgtEl>
-                                          <p:spTgt spid="3">
-                                            <p:txEl>
-                                              <p:pRg st="2" end="2"/>
-                                            </p:txEl>
-                                          </p:spTgt>
-                                        </p:tgtEl>
-                                      </p:cBhvr>
-                                    </p:animEffect>
                                   </p:childTnLst>
                                 </p:cTn>
                               </p:par>
-                            </p:childTnLst>
-                          </p:cTn>
-                        </p:par>
-                      </p:childTnLst>
-                    </p:cTn>
-                  </p:par>
-                  <p:par>
-                    <p:cTn id="18" fill="hold">
-                      <p:stCondLst>
-                        <p:cond delay="indefinite"/>
-                      </p:stCondLst>
-                      <p:childTnLst>
-                        <p:par>
-                          <p:cTn id="19" fill="hold">
-                            <p:stCondLst>
-                              <p:cond delay="0"/>
-                            </p:stCondLst>
-                            <p:childTnLst>
                               <p:par>
-                                <p:cTn id="20" presetID="10" presetClass="entr" presetSubtype="0" fill="hold" grpId="0" nodeType="clickEffect">
+                                <p:cTn id="25" presetID="10" presetClass="exit" presetSubtype="0" fill="hold" nodeType="withEffect">
                                   <p:stCondLst>
                                     <p:cond delay="0"/>
                                   </p:stCondLst>
                                   <p:childTnLst>
+                                    <p:animEffect transition="out" filter="fade">
+                                      <p:cBhvr>
+                                        <p:cTn id="26" dur="500"/>
+                                        <p:tgtEl>
+                                          <p:spTgt spid="14"/>
+                                        </p:tgtEl>
+                                      </p:cBhvr>
+                                    </p:animEffect>
                                     <p:set>
                                       <p:cBhvr>
-                                        <p:cTn id="21" dur="1" fill="hold">
+                                        <p:cTn id="27" dur="1" fill="hold">
                                           <p:stCondLst>
-                                            <p:cond delay="0"/>
+                                            <p:cond delay="499"/>
                                           </p:stCondLst>
                                         </p:cTn>
                                         <p:tgtEl>
-                                          <p:spTgt spid="3">
-                                            <p:txEl>
-                                              <p:pRg st="3" end="3"/>
-                                            </p:txEl>
-                                          </p:spTgt>
+                                          <p:spTgt spid="14"/>
                                         </p:tgtEl>
                                         <p:attrNameLst>
                                           <p:attrName>style.visibility</p:attrName>
                                         </p:attrNameLst>
                                       </p:cBhvr>
                                       <p:to>
-                                        <p:strVal val="visible"/>
+                                        <p:strVal val="hidden"/>
                                       </p:to>
                                     </p:set>
-                                    <p:animEffect transition="in" filter="fade">
-                                      <p:cBhvr>
-                                        <p:cTn id="22" dur="500"/>
-                                        <p:tgtEl>
-                                          <p:spTgt spid="3">
-                                            <p:txEl>
-                                              <p:pRg st="3" end="3"/>
-                                            </p:txEl>
-                                          </p:spTgt>
-                                        </p:tgtEl>
-                                      </p:cBhvr>
-                                    </p:animEffect>
                                   </p:childTnLst>
                                 </p:cTn>
                               </p:par>
-                            </p:childTnLst>
-                          </p:cTn>
-                        </p:par>
-                      </p:childTnLst>
-                    </p:cTn>
-                  </p:par>
-                  <p:par>
-                    <p:cTn id="23" fill="hold">
-                      <p:stCondLst>
-                        <p:cond delay="indefinite"/>
-                      </p:stCondLst>
-                      <p:childTnLst>
-                        <p:par>
-                          <p:cTn id="24" fill="hold">
-                            <p:stCondLst>
-                              <p:cond delay="0"/>
-                            </p:stCondLst>
-                            <p:childTnLst>
                               <p:par>
-                                <p:cTn id="25" presetID="10" presetClass="entr" presetSubtype="0" fill="hold" grpId="0" nodeType="clickEffect">
+                                <p:cTn id="28" presetID="10" presetClass="exit" presetSubtype="0" fill="hold" grpId="1" nodeType="withEffect">
                                   <p:stCondLst>
                                     <p:cond delay="0"/>
                                   </p:stCondLst>
                                   <p:childTnLst>
+                                    <p:animEffect transition="out" filter="fade">
+                                      <p:cBhvr>
+                                        <p:cTn id="29" dur="500"/>
+                                        <p:tgtEl>
+                                          <p:spTgt spid="16"/>
+                                        </p:tgtEl>
+                                      </p:cBhvr>
+                                    </p:animEffect>
                                     <p:set>
                                       <p:cBhvr>
-                                        <p:cTn id="26" dur="1" fill="hold">
+                                        <p:cTn id="30" dur="1" fill="hold">
                                           <p:stCondLst>
-                                            <p:cond delay="0"/>
+                                            <p:cond delay="499"/>
                                           </p:stCondLst>
                                         </p:cTn>
                                         <p:tgtEl>
-                                          <p:spTgt spid="3">
-                                            <p:txEl>
-                                              <p:pRg st="4" end="4"/>
-                                            </p:txEl>
-                                          </p:spTgt>
+                                          <p:spTgt spid="16"/>
                                         </p:tgtEl>
                                         <p:attrNameLst>
                                           <p:attrName>style.visibility</p:attrName>
                                         </p:attrNameLst>
                                       </p:cBhvr>
                                       <p:to>
-                                        <p:strVal val="visible"/>
+                                        <p:strVal val="hidden"/>
                                       </p:to>
                                     </p:set>
-                                    <p:animEffect transition="in" filter="fade">
-                                      <p:cBhvr>
-                                        <p:cTn id="27" dur="500"/>
-                                        <p:tgtEl>
-                                          <p:spTgt spid="3">
-                                            <p:txEl>
-                                              <p:pRg st="4" end="4"/>
-                                            </p:txEl>
-                                          </p:spTgt>
-                                        </p:tgtEl>
-                                      </p:cBhvr>
-                                    </p:animEffect>
-                                  </p:childTnLst>
-                                </p:cTn>
-                              </p:par>
-                            </p:childTnLst>
-                          </p:cTn>
-                        </p:par>
-                      </p:childTnLst>
-                    </p:cTn>
-                  </p:par>
-                  <p:par>
-                    <p:cTn id="28" fill="hold">
-                      <p:stCondLst>
-                        <p:cond delay="indefinite"/>
-                      </p:stCondLst>
-                      <p:childTnLst>
-                        <p:par>
-                          <p:cTn id="29" fill="hold">
-                            <p:stCondLst>
-                              <p:cond delay="0"/>
-                            </p:stCondLst>
-                            <p:childTnLst>
-                              <p:par>
-                                <p:cTn id="30" presetID="10" presetClass="entr" presetSubtype="0" fill="hold" grpId="0" nodeType="clickEffect">
-                                  <p:stCondLst>
-                                    <p:cond delay="0"/>
-                                  </p:stCondLst>
-                                  <p:childTnLst>
-                                    <p:set>
-                                      <p:cBhvr>
-                                        <p:cTn id="31" dur="1" fill="hold">
-                                          <p:stCondLst>
-                                            <p:cond delay="0"/>
-                                          </p:stCondLst>
-                                        </p:cTn>
-                                        <p:tgtEl>
-                                          <p:spTgt spid="3">
-                                            <p:txEl>
-                                              <p:pRg st="5" end="5"/>
-                                            </p:txEl>
-                                          </p:spTgt>
-                                        </p:tgtEl>
-                                        <p:attrNameLst>
-                                          <p:attrName>style.visibility</p:attrName>
-                                        </p:attrNameLst>
-                                      </p:cBhvr>
-                                      <p:to>
-                                        <p:strVal val="visible"/>
-                                      </p:to>
-                                    </p:set>
-                                    <p:animEffect transition="in" filter="fade">
-                                      <p:cBhvr>
-                                        <p:cTn id="32" dur="500"/>
-                                        <p:tgtEl>
-                                          <p:spTgt spid="3">
-                                            <p:txEl>
-                                              <p:pRg st="5" end="5"/>
-                                            </p:txEl>
-                                          </p:spTgt>
-                                        </p:tgtEl>
-                                      </p:cBhvr>
-                                    </p:animEffect>
                                   </p:childTnLst>
                                 </p:cTn>
                               </p:par>
@@ -11999,7 +12720,11 @@
       </p:par>
     </p:tnLst>
     <p:bldLst>
-      <p:bldP spid="3" grpId="0" build="p"/>
+      <p:bldP spid="12" grpId="0"/>
+      <p:bldP spid="12" grpId="1"/>
+      <p:bldP spid="16" grpId="0"/>
+      <p:bldP spid="16" grpId="1"/>
+      <p:bldP spid="17" grpId="0"/>
     </p:bldLst>
   </p:timing>
 </p:sld>
@@ -12082,7 +12807,7 @@
     </p:spTree>
     <p:extLst>
       <p:ext uri="{BB962C8B-B14F-4D97-AF65-F5344CB8AC3E}">
-        <p14:creationId xmlns:p14="http://schemas.microsoft.com/office/powerpoint/2010/main" val="2253753459"/>
+        <p14:creationId xmlns:p14="http://schemas.microsoft.com/office/powerpoint/2010/main" val="3635652175"/>
       </p:ext>
     </p:extLst>
   </p:cSld>
@@ -12184,17 +12909,17 @@
           </a:p>
           <a:p>
             <a:r>
-              <a:rPr lang="en-GB" dirty="0" smtClean="0"/>
-              <a:t>Introduction to Observable Arrays</a:t>
-            </a:r>
-          </a:p>
-          <a:p>
-            <a:r>
               <a:rPr lang="en-GB" dirty="0" smtClean="0">
                 <a:solidFill>
                   <a:srgbClr val="EF8B19"/>
                 </a:solidFill>
               </a:rPr>
+              <a:t>Introduction to Observable Arrays</a:t>
+            </a:r>
+          </a:p>
+          <a:p>
+            <a:r>
+              <a:rPr lang="en-GB" dirty="0" smtClean="0"/>
               <a:t>Introduction to Computed Observables</a:t>
             </a:r>
             <a:endParaRPr lang="en-GB" dirty="0"/>
@@ -12204,7 +12929,7 @@
     </p:spTree>
     <p:extLst>
       <p:ext uri="{BB962C8B-B14F-4D97-AF65-F5344CB8AC3E}">
-        <p14:creationId xmlns:p14="http://schemas.microsoft.com/office/powerpoint/2010/main" val="1948410651"/>
+        <p14:creationId xmlns:p14="http://schemas.microsoft.com/office/powerpoint/2010/main" val="466631671"/>
       </p:ext>
     </p:extLst>
   </p:cSld>
@@ -12693,6 +13418,617 @@
     </p:spTree>
     <p:extLst>
       <p:ext uri="{BB962C8B-B14F-4D97-AF65-F5344CB8AC3E}">
+        <p14:creationId xmlns:p14="http://schemas.microsoft.com/office/powerpoint/2010/main" val="2253753459"/>
+      </p:ext>
+    </p:extLst>
+  </p:cSld>
+  <p:clrMapOvr>
+    <a:masterClrMapping/>
+  </p:clrMapOvr>
+  <p:transition>
+    <p:fade/>
+  </p:transition>
+  <p:timing>
+    <p:tnLst>
+      <p:par>
+        <p:cTn id="1" dur="indefinite" restart="never" nodeType="tmRoot"/>
+      </p:par>
+    </p:tnLst>
+  </p:timing>
+</p:sld>
+</file>
+
+<file path=ppt/slides/slide24.xml><?xml version="1.0" encoding="utf-8"?>
+<p:sld xmlns:a="http://schemas.openxmlformats.org/drawingml/2006/main" xmlns:r="http://schemas.openxmlformats.org/officeDocument/2006/relationships" xmlns:p="http://schemas.openxmlformats.org/presentationml/2006/main">
+  <p:cSld>
+    <p:spTree>
+      <p:nvGrpSpPr>
+        <p:cNvPr id="1" name=""/>
+        <p:cNvGrpSpPr/>
+        <p:nvPr/>
+      </p:nvGrpSpPr>
+      <p:grpSpPr>
+        <a:xfrm>
+          <a:off x="0" y="0"/>
+          <a:ext cx="0" cy="0"/>
+          <a:chOff x="0" y="0"/>
+          <a:chExt cx="0" cy="0"/>
+        </a:xfrm>
+      </p:grpSpPr>
+      <p:sp>
+        <p:nvSpPr>
+          <p:cNvPr id="2" name="Title 1"/>
+          <p:cNvSpPr>
+            <a:spLocks noGrp="1"/>
+          </p:cNvSpPr>
+          <p:nvPr>
+            <p:ph type="title"/>
+          </p:nvPr>
+        </p:nvSpPr>
+        <p:spPr/>
+        <p:txBody>
+          <a:bodyPr/>
+          <a:lstStyle/>
+          <a:p>
+            <a:r>
+              <a:rPr lang="en-US" dirty="0" smtClean="0"/>
+              <a:t>Agenda		</a:t>
+            </a:r>
+            <a:endParaRPr lang="en-GB" dirty="0"/>
+          </a:p>
+        </p:txBody>
+      </p:sp>
+      <p:sp>
+        <p:nvSpPr>
+          <p:cNvPr id="3" name="Text Placeholder 2"/>
+          <p:cNvSpPr>
+            <a:spLocks noGrp="1"/>
+          </p:cNvSpPr>
+          <p:nvPr>
+            <p:ph type="body" idx="1"/>
+          </p:nvPr>
+        </p:nvSpPr>
+        <p:spPr/>
+        <p:txBody>
+          <a:bodyPr/>
+          <a:lstStyle/>
+          <a:p>
+            <a:r>
+              <a:rPr lang="en-US" dirty="0" smtClean="0">
+                <a:latin typeface="+mn-lt"/>
+              </a:rPr>
+              <a:t>Learn about Knockout.js</a:t>
+            </a:r>
+          </a:p>
+          <a:p>
+            <a:r>
+              <a:rPr lang="en-GB" dirty="0" smtClean="0"/>
+              <a:t>Learn about Typescript</a:t>
+            </a:r>
+          </a:p>
+          <a:p>
+            <a:r>
+              <a:rPr lang="en-GB" dirty="0" smtClean="0"/>
+              <a:t>Introduction to Context Binding</a:t>
+            </a:r>
+          </a:p>
+          <a:p>
+            <a:r>
+              <a:rPr lang="en-GB" dirty="0" smtClean="0"/>
+              <a:t>Introduction to Observable Properties</a:t>
+            </a:r>
+          </a:p>
+          <a:p>
+            <a:r>
+              <a:rPr lang="en-GB" dirty="0" smtClean="0"/>
+              <a:t>Introduction to Observable Arrays</a:t>
+            </a:r>
+          </a:p>
+          <a:p>
+            <a:r>
+              <a:rPr lang="en-GB" dirty="0" smtClean="0">
+                <a:solidFill>
+                  <a:srgbClr val="EF8B19"/>
+                </a:solidFill>
+              </a:rPr>
+              <a:t>Introduction to Computed Observables</a:t>
+            </a:r>
+            <a:endParaRPr lang="en-GB" dirty="0"/>
+          </a:p>
+        </p:txBody>
+      </p:sp>
+    </p:spTree>
+    <p:extLst>
+      <p:ext uri="{BB962C8B-B14F-4D97-AF65-F5344CB8AC3E}">
+        <p14:creationId xmlns:p14="http://schemas.microsoft.com/office/powerpoint/2010/main" val="1948410651"/>
+      </p:ext>
+    </p:extLst>
+  </p:cSld>
+  <p:clrMapOvr>
+    <a:masterClrMapping/>
+  </p:clrMapOvr>
+  <p:transition>
+    <p:fade/>
+  </p:transition>
+  <p:timing>
+    <p:tnLst>
+      <p:par>
+        <p:cTn id="1" dur="indefinite" restart="never" nodeType="tmRoot">
+          <p:childTnLst>
+            <p:seq concurrent="1" nextAc="seek">
+              <p:cTn id="2" dur="indefinite" nodeType="mainSeq">
+                <p:childTnLst>
+                  <p:par>
+                    <p:cTn id="3" fill="hold">
+                      <p:stCondLst>
+                        <p:cond delay="indefinite"/>
+                      </p:stCondLst>
+                      <p:childTnLst>
+                        <p:par>
+                          <p:cTn id="4" fill="hold">
+                            <p:stCondLst>
+                              <p:cond delay="0"/>
+                            </p:stCondLst>
+                            <p:childTnLst>
+                              <p:par>
+                                <p:cTn id="5" presetID="10" presetClass="entr" presetSubtype="0" fill="hold" grpId="0" nodeType="clickEffect">
+                                  <p:stCondLst>
+                                    <p:cond delay="0"/>
+                                  </p:stCondLst>
+                                  <p:childTnLst>
+                                    <p:set>
+                                      <p:cBhvr>
+                                        <p:cTn id="6" dur="1" fill="hold">
+                                          <p:stCondLst>
+                                            <p:cond delay="0"/>
+                                          </p:stCondLst>
+                                        </p:cTn>
+                                        <p:tgtEl>
+                                          <p:spTgt spid="3">
+                                            <p:txEl>
+                                              <p:pRg st="0" end="0"/>
+                                            </p:txEl>
+                                          </p:spTgt>
+                                        </p:tgtEl>
+                                        <p:attrNameLst>
+                                          <p:attrName>style.visibility</p:attrName>
+                                        </p:attrNameLst>
+                                      </p:cBhvr>
+                                      <p:to>
+                                        <p:strVal val="visible"/>
+                                      </p:to>
+                                    </p:set>
+                                    <p:animEffect transition="in" filter="fade">
+                                      <p:cBhvr>
+                                        <p:cTn id="7" dur="500"/>
+                                        <p:tgtEl>
+                                          <p:spTgt spid="3">
+                                            <p:txEl>
+                                              <p:pRg st="0" end="0"/>
+                                            </p:txEl>
+                                          </p:spTgt>
+                                        </p:tgtEl>
+                                      </p:cBhvr>
+                                    </p:animEffect>
+                                  </p:childTnLst>
+                                </p:cTn>
+                              </p:par>
+                            </p:childTnLst>
+                          </p:cTn>
+                        </p:par>
+                      </p:childTnLst>
+                    </p:cTn>
+                  </p:par>
+                  <p:par>
+                    <p:cTn id="8" fill="hold">
+                      <p:stCondLst>
+                        <p:cond delay="indefinite"/>
+                      </p:stCondLst>
+                      <p:childTnLst>
+                        <p:par>
+                          <p:cTn id="9" fill="hold">
+                            <p:stCondLst>
+                              <p:cond delay="0"/>
+                            </p:stCondLst>
+                            <p:childTnLst>
+                              <p:par>
+                                <p:cTn id="10" presetID="10" presetClass="entr" presetSubtype="0" fill="hold" grpId="0" nodeType="clickEffect">
+                                  <p:stCondLst>
+                                    <p:cond delay="0"/>
+                                  </p:stCondLst>
+                                  <p:childTnLst>
+                                    <p:set>
+                                      <p:cBhvr>
+                                        <p:cTn id="11" dur="1" fill="hold">
+                                          <p:stCondLst>
+                                            <p:cond delay="0"/>
+                                          </p:stCondLst>
+                                        </p:cTn>
+                                        <p:tgtEl>
+                                          <p:spTgt spid="3">
+                                            <p:txEl>
+                                              <p:pRg st="1" end="1"/>
+                                            </p:txEl>
+                                          </p:spTgt>
+                                        </p:tgtEl>
+                                        <p:attrNameLst>
+                                          <p:attrName>style.visibility</p:attrName>
+                                        </p:attrNameLst>
+                                      </p:cBhvr>
+                                      <p:to>
+                                        <p:strVal val="visible"/>
+                                      </p:to>
+                                    </p:set>
+                                    <p:animEffect transition="in" filter="fade">
+                                      <p:cBhvr>
+                                        <p:cTn id="12" dur="500"/>
+                                        <p:tgtEl>
+                                          <p:spTgt spid="3">
+                                            <p:txEl>
+                                              <p:pRg st="1" end="1"/>
+                                            </p:txEl>
+                                          </p:spTgt>
+                                        </p:tgtEl>
+                                      </p:cBhvr>
+                                    </p:animEffect>
+                                  </p:childTnLst>
+                                </p:cTn>
+                              </p:par>
+                            </p:childTnLst>
+                          </p:cTn>
+                        </p:par>
+                      </p:childTnLst>
+                    </p:cTn>
+                  </p:par>
+                  <p:par>
+                    <p:cTn id="13" fill="hold">
+                      <p:stCondLst>
+                        <p:cond delay="indefinite"/>
+                      </p:stCondLst>
+                      <p:childTnLst>
+                        <p:par>
+                          <p:cTn id="14" fill="hold">
+                            <p:stCondLst>
+                              <p:cond delay="0"/>
+                            </p:stCondLst>
+                            <p:childTnLst>
+                              <p:par>
+                                <p:cTn id="15" presetID="10" presetClass="entr" presetSubtype="0" fill="hold" grpId="0" nodeType="clickEffect">
+                                  <p:stCondLst>
+                                    <p:cond delay="0"/>
+                                  </p:stCondLst>
+                                  <p:childTnLst>
+                                    <p:set>
+                                      <p:cBhvr>
+                                        <p:cTn id="16" dur="1" fill="hold">
+                                          <p:stCondLst>
+                                            <p:cond delay="0"/>
+                                          </p:stCondLst>
+                                        </p:cTn>
+                                        <p:tgtEl>
+                                          <p:spTgt spid="3">
+                                            <p:txEl>
+                                              <p:pRg st="2" end="2"/>
+                                            </p:txEl>
+                                          </p:spTgt>
+                                        </p:tgtEl>
+                                        <p:attrNameLst>
+                                          <p:attrName>style.visibility</p:attrName>
+                                        </p:attrNameLst>
+                                      </p:cBhvr>
+                                      <p:to>
+                                        <p:strVal val="visible"/>
+                                      </p:to>
+                                    </p:set>
+                                    <p:animEffect transition="in" filter="fade">
+                                      <p:cBhvr>
+                                        <p:cTn id="17" dur="500"/>
+                                        <p:tgtEl>
+                                          <p:spTgt spid="3">
+                                            <p:txEl>
+                                              <p:pRg st="2" end="2"/>
+                                            </p:txEl>
+                                          </p:spTgt>
+                                        </p:tgtEl>
+                                      </p:cBhvr>
+                                    </p:animEffect>
+                                  </p:childTnLst>
+                                </p:cTn>
+                              </p:par>
+                            </p:childTnLst>
+                          </p:cTn>
+                        </p:par>
+                      </p:childTnLst>
+                    </p:cTn>
+                  </p:par>
+                  <p:par>
+                    <p:cTn id="18" fill="hold">
+                      <p:stCondLst>
+                        <p:cond delay="indefinite"/>
+                      </p:stCondLst>
+                      <p:childTnLst>
+                        <p:par>
+                          <p:cTn id="19" fill="hold">
+                            <p:stCondLst>
+                              <p:cond delay="0"/>
+                            </p:stCondLst>
+                            <p:childTnLst>
+                              <p:par>
+                                <p:cTn id="20" presetID="10" presetClass="entr" presetSubtype="0" fill="hold" grpId="0" nodeType="clickEffect">
+                                  <p:stCondLst>
+                                    <p:cond delay="0"/>
+                                  </p:stCondLst>
+                                  <p:childTnLst>
+                                    <p:set>
+                                      <p:cBhvr>
+                                        <p:cTn id="21" dur="1" fill="hold">
+                                          <p:stCondLst>
+                                            <p:cond delay="0"/>
+                                          </p:stCondLst>
+                                        </p:cTn>
+                                        <p:tgtEl>
+                                          <p:spTgt spid="3">
+                                            <p:txEl>
+                                              <p:pRg st="3" end="3"/>
+                                            </p:txEl>
+                                          </p:spTgt>
+                                        </p:tgtEl>
+                                        <p:attrNameLst>
+                                          <p:attrName>style.visibility</p:attrName>
+                                        </p:attrNameLst>
+                                      </p:cBhvr>
+                                      <p:to>
+                                        <p:strVal val="visible"/>
+                                      </p:to>
+                                    </p:set>
+                                    <p:animEffect transition="in" filter="fade">
+                                      <p:cBhvr>
+                                        <p:cTn id="22" dur="500"/>
+                                        <p:tgtEl>
+                                          <p:spTgt spid="3">
+                                            <p:txEl>
+                                              <p:pRg st="3" end="3"/>
+                                            </p:txEl>
+                                          </p:spTgt>
+                                        </p:tgtEl>
+                                      </p:cBhvr>
+                                    </p:animEffect>
+                                  </p:childTnLst>
+                                </p:cTn>
+                              </p:par>
+                            </p:childTnLst>
+                          </p:cTn>
+                        </p:par>
+                      </p:childTnLst>
+                    </p:cTn>
+                  </p:par>
+                  <p:par>
+                    <p:cTn id="23" fill="hold">
+                      <p:stCondLst>
+                        <p:cond delay="indefinite"/>
+                      </p:stCondLst>
+                      <p:childTnLst>
+                        <p:par>
+                          <p:cTn id="24" fill="hold">
+                            <p:stCondLst>
+                              <p:cond delay="0"/>
+                            </p:stCondLst>
+                            <p:childTnLst>
+                              <p:par>
+                                <p:cTn id="25" presetID="10" presetClass="entr" presetSubtype="0" fill="hold" grpId="0" nodeType="clickEffect">
+                                  <p:stCondLst>
+                                    <p:cond delay="0"/>
+                                  </p:stCondLst>
+                                  <p:childTnLst>
+                                    <p:set>
+                                      <p:cBhvr>
+                                        <p:cTn id="26" dur="1" fill="hold">
+                                          <p:stCondLst>
+                                            <p:cond delay="0"/>
+                                          </p:stCondLst>
+                                        </p:cTn>
+                                        <p:tgtEl>
+                                          <p:spTgt spid="3">
+                                            <p:txEl>
+                                              <p:pRg st="4" end="4"/>
+                                            </p:txEl>
+                                          </p:spTgt>
+                                        </p:tgtEl>
+                                        <p:attrNameLst>
+                                          <p:attrName>style.visibility</p:attrName>
+                                        </p:attrNameLst>
+                                      </p:cBhvr>
+                                      <p:to>
+                                        <p:strVal val="visible"/>
+                                      </p:to>
+                                    </p:set>
+                                    <p:animEffect transition="in" filter="fade">
+                                      <p:cBhvr>
+                                        <p:cTn id="27" dur="500"/>
+                                        <p:tgtEl>
+                                          <p:spTgt spid="3">
+                                            <p:txEl>
+                                              <p:pRg st="4" end="4"/>
+                                            </p:txEl>
+                                          </p:spTgt>
+                                        </p:tgtEl>
+                                      </p:cBhvr>
+                                    </p:animEffect>
+                                  </p:childTnLst>
+                                </p:cTn>
+                              </p:par>
+                            </p:childTnLst>
+                          </p:cTn>
+                        </p:par>
+                      </p:childTnLst>
+                    </p:cTn>
+                  </p:par>
+                  <p:par>
+                    <p:cTn id="28" fill="hold">
+                      <p:stCondLst>
+                        <p:cond delay="indefinite"/>
+                      </p:stCondLst>
+                      <p:childTnLst>
+                        <p:par>
+                          <p:cTn id="29" fill="hold">
+                            <p:stCondLst>
+                              <p:cond delay="0"/>
+                            </p:stCondLst>
+                            <p:childTnLst>
+                              <p:par>
+                                <p:cTn id="30" presetID="10" presetClass="entr" presetSubtype="0" fill="hold" grpId="0" nodeType="clickEffect">
+                                  <p:stCondLst>
+                                    <p:cond delay="0"/>
+                                  </p:stCondLst>
+                                  <p:childTnLst>
+                                    <p:set>
+                                      <p:cBhvr>
+                                        <p:cTn id="31" dur="1" fill="hold">
+                                          <p:stCondLst>
+                                            <p:cond delay="0"/>
+                                          </p:stCondLst>
+                                        </p:cTn>
+                                        <p:tgtEl>
+                                          <p:spTgt spid="3">
+                                            <p:txEl>
+                                              <p:pRg st="5" end="5"/>
+                                            </p:txEl>
+                                          </p:spTgt>
+                                        </p:tgtEl>
+                                        <p:attrNameLst>
+                                          <p:attrName>style.visibility</p:attrName>
+                                        </p:attrNameLst>
+                                      </p:cBhvr>
+                                      <p:to>
+                                        <p:strVal val="visible"/>
+                                      </p:to>
+                                    </p:set>
+                                    <p:animEffect transition="in" filter="fade">
+                                      <p:cBhvr>
+                                        <p:cTn id="32" dur="500"/>
+                                        <p:tgtEl>
+                                          <p:spTgt spid="3">
+                                            <p:txEl>
+                                              <p:pRg st="5" end="5"/>
+                                            </p:txEl>
+                                          </p:spTgt>
+                                        </p:tgtEl>
+                                      </p:cBhvr>
+                                    </p:animEffect>
+                                  </p:childTnLst>
+                                </p:cTn>
+                              </p:par>
+                            </p:childTnLst>
+                          </p:cTn>
+                        </p:par>
+                      </p:childTnLst>
+                    </p:cTn>
+                  </p:par>
+                </p:childTnLst>
+              </p:cTn>
+              <p:prevCondLst>
+                <p:cond evt="onPrev" delay="0">
+                  <p:tgtEl>
+                    <p:sldTgt/>
+                  </p:tgtEl>
+                </p:cond>
+              </p:prevCondLst>
+              <p:nextCondLst>
+                <p:cond evt="onNext" delay="0">
+                  <p:tgtEl>
+                    <p:sldTgt/>
+                  </p:tgtEl>
+                </p:cond>
+              </p:nextCondLst>
+            </p:seq>
+          </p:childTnLst>
+        </p:cTn>
+      </p:par>
+    </p:tnLst>
+    <p:bldLst>
+      <p:bldP spid="3" grpId="0" build="p"/>
+    </p:bldLst>
+  </p:timing>
+</p:sld>
+</file>
+
+<file path=ppt/slides/slide25.xml><?xml version="1.0" encoding="utf-8"?>
+<p:sld xmlns:a="http://schemas.openxmlformats.org/drawingml/2006/main" xmlns:r="http://schemas.openxmlformats.org/officeDocument/2006/relationships" xmlns:p="http://schemas.openxmlformats.org/presentationml/2006/main" show="0">
+  <p:cSld>
+    <p:bg>
+      <p:bgPr>
+        <a:solidFill>
+          <a:schemeClr val="accent2"/>
+        </a:solidFill>
+        <a:effectLst/>
+      </p:bgPr>
+    </p:bg>
+    <p:spTree>
+      <p:nvGrpSpPr>
+        <p:cNvPr id="1" name=""/>
+        <p:cNvGrpSpPr/>
+        <p:nvPr/>
+      </p:nvGrpSpPr>
+      <p:grpSpPr>
+        <a:xfrm>
+          <a:off x="0" y="0"/>
+          <a:ext cx="0" cy="0"/>
+          <a:chOff x="0" y="0"/>
+          <a:chExt cx="0" cy="0"/>
+        </a:xfrm>
+      </p:grpSpPr>
+      <p:sp>
+        <p:nvSpPr>
+          <p:cNvPr id="2" name="Title 1"/>
+          <p:cNvSpPr>
+            <a:spLocks noGrp="1"/>
+          </p:cNvSpPr>
+          <p:nvPr>
+            <p:ph type="title"/>
+          </p:nvPr>
+        </p:nvSpPr>
+        <p:spPr/>
+        <p:txBody>
+          <a:bodyPr/>
+          <a:lstStyle/>
+          <a:p>
+            <a:r>
+              <a:rPr lang="en-US" dirty="0" smtClean="0"/>
+              <a:t>END OF Overview Slides		</a:t>
+            </a:r>
+            <a:endParaRPr lang="en-GB" dirty="0"/>
+          </a:p>
+        </p:txBody>
+      </p:sp>
+      <p:sp>
+        <p:nvSpPr>
+          <p:cNvPr id="3" name="Text Placeholder 2"/>
+          <p:cNvSpPr>
+            <a:spLocks noGrp="1"/>
+          </p:cNvSpPr>
+          <p:nvPr>
+            <p:ph type="body" idx="1"/>
+          </p:nvPr>
+        </p:nvSpPr>
+        <p:spPr/>
+        <p:txBody>
+          <a:bodyPr/>
+          <a:lstStyle/>
+          <a:p>
+            <a:pPr marL="0" indent="0">
+              <a:buNone/>
+            </a:pPr>
+            <a:r>
+              <a:rPr lang="en-GB" dirty="0" smtClean="0"/>
+              <a:t>	</a:t>
+            </a:r>
+            <a:endParaRPr lang="en-GB" dirty="0"/>
+          </a:p>
+        </p:txBody>
+      </p:sp>
+    </p:spTree>
+    <p:extLst>
+      <p:ext uri="{BB962C8B-B14F-4D97-AF65-F5344CB8AC3E}">
         <p14:creationId xmlns:p14="http://schemas.microsoft.com/office/powerpoint/2010/main" val="2138273216"/>
       </p:ext>
     </p:extLst>
@@ -12713,7 +14049,7 @@
 </p:sld>
 </file>
 
-<file path=ppt/slides/slide24.xml><?xml version="1.0" encoding="utf-8"?>
+<file path=ppt/slides/slide26.xml><?xml version="1.0" encoding="utf-8"?>
 <p:sld xmlns:a="http://schemas.openxmlformats.org/drawingml/2006/main" xmlns:r="http://schemas.openxmlformats.org/officeDocument/2006/relationships" xmlns:p="http://schemas.openxmlformats.org/presentationml/2006/main">
   <p:cSld>
     <p:spTree>
@@ -15054,401 +16390,9 @@
   <p:timing>
     <p:tnLst>
       <p:par>
-        <p:cTn id="1" dur="indefinite" restart="never" nodeType="tmRoot">
-          <p:childTnLst>
-            <p:seq concurrent="1" nextAc="seek">
-              <p:cTn id="2" dur="indefinite" nodeType="mainSeq">
-                <p:childTnLst>
-                  <p:par>
-                    <p:cTn id="3" fill="hold">
-                      <p:stCondLst>
-                        <p:cond delay="indefinite"/>
-                      </p:stCondLst>
-                      <p:childTnLst>
-                        <p:par>
-                          <p:cTn id="4" fill="hold">
-                            <p:stCondLst>
-                              <p:cond delay="0"/>
-                            </p:stCondLst>
-                            <p:childTnLst>
-                              <p:par>
-                                <p:cTn id="5" presetID="10" presetClass="entr" presetSubtype="0" fill="hold" grpId="0" nodeType="clickEffect">
-                                  <p:stCondLst>
-                                    <p:cond delay="0"/>
-                                  </p:stCondLst>
-                                  <p:childTnLst>
-                                    <p:set>
-                                      <p:cBhvr>
-                                        <p:cTn id="6" dur="1" fill="hold">
-                                          <p:stCondLst>
-                                            <p:cond delay="0"/>
-                                          </p:stCondLst>
-                                        </p:cTn>
-                                        <p:tgtEl>
-                                          <p:spTgt spid="3">
-                                            <p:txEl>
-                                              <p:pRg st="0" end="0"/>
-                                            </p:txEl>
-                                          </p:spTgt>
-                                        </p:tgtEl>
-                                        <p:attrNameLst>
-                                          <p:attrName>style.visibility</p:attrName>
-                                        </p:attrNameLst>
-                                      </p:cBhvr>
-                                      <p:to>
-                                        <p:strVal val="visible"/>
-                                      </p:to>
-                                    </p:set>
-                                    <p:animEffect transition="in" filter="fade">
-                                      <p:cBhvr>
-                                        <p:cTn id="7" dur="500"/>
-                                        <p:tgtEl>
-                                          <p:spTgt spid="3">
-                                            <p:txEl>
-                                              <p:pRg st="0" end="0"/>
-                                            </p:txEl>
-                                          </p:spTgt>
-                                        </p:tgtEl>
-                                      </p:cBhvr>
-                                    </p:animEffect>
-                                  </p:childTnLst>
-                                </p:cTn>
-                              </p:par>
-                            </p:childTnLst>
-                          </p:cTn>
-                        </p:par>
-                      </p:childTnLst>
-                    </p:cTn>
-                  </p:par>
-                  <p:par>
-                    <p:cTn id="8" fill="hold">
-                      <p:stCondLst>
-                        <p:cond delay="indefinite"/>
-                      </p:stCondLst>
-                      <p:childTnLst>
-                        <p:par>
-                          <p:cTn id="9" fill="hold">
-                            <p:stCondLst>
-                              <p:cond delay="0"/>
-                            </p:stCondLst>
-                            <p:childTnLst>
-                              <p:par>
-                                <p:cTn id="10" presetID="10" presetClass="entr" presetSubtype="0" fill="hold" grpId="0" nodeType="clickEffect">
-                                  <p:stCondLst>
-                                    <p:cond delay="0"/>
-                                  </p:stCondLst>
-                                  <p:childTnLst>
-                                    <p:set>
-                                      <p:cBhvr>
-                                        <p:cTn id="11" dur="1" fill="hold">
-                                          <p:stCondLst>
-                                            <p:cond delay="0"/>
-                                          </p:stCondLst>
-                                        </p:cTn>
-                                        <p:tgtEl>
-                                          <p:spTgt spid="3">
-                                            <p:txEl>
-                                              <p:pRg st="1" end="1"/>
-                                            </p:txEl>
-                                          </p:spTgt>
-                                        </p:tgtEl>
-                                        <p:attrNameLst>
-                                          <p:attrName>style.visibility</p:attrName>
-                                        </p:attrNameLst>
-                                      </p:cBhvr>
-                                      <p:to>
-                                        <p:strVal val="visible"/>
-                                      </p:to>
-                                    </p:set>
-                                    <p:animEffect transition="in" filter="fade">
-                                      <p:cBhvr>
-                                        <p:cTn id="12" dur="500"/>
-                                        <p:tgtEl>
-                                          <p:spTgt spid="3">
-                                            <p:txEl>
-                                              <p:pRg st="1" end="1"/>
-                                            </p:txEl>
-                                          </p:spTgt>
-                                        </p:tgtEl>
-                                      </p:cBhvr>
-                                    </p:animEffect>
-                                  </p:childTnLst>
-                                </p:cTn>
-                              </p:par>
-                            </p:childTnLst>
-                          </p:cTn>
-                        </p:par>
-                      </p:childTnLst>
-                    </p:cTn>
-                  </p:par>
-                  <p:par>
-                    <p:cTn id="13" fill="hold">
-                      <p:stCondLst>
-                        <p:cond delay="indefinite"/>
-                      </p:stCondLst>
-                      <p:childTnLst>
-                        <p:par>
-                          <p:cTn id="14" fill="hold">
-                            <p:stCondLst>
-                              <p:cond delay="0"/>
-                            </p:stCondLst>
-                            <p:childTnLst>
-                              <p:par>
-                                <p:cTn id="15" presetID="10" presetClass="entr" presetSubtype="0" fill="hold" grpId="0" nodeType="clickEffect">
-                                  <p:stCondLst>
-                                    <p:cond delay="0"/>
-                                  </p:stCondLst>
-                                  <p:childTnLst>
-                                    <p:set>
-                                      <p:cBhvr>
-                                        <p:cTn id="16" dur="1" fill="hold">
-                                          <p:stCondLst>
-                                            <p:cond delay="0"/>
-                                          </p:stCondLst>
-                                        </p:cTn>
-                                        <p:tgtEl>
-                                          <p:spTgt spid="3">
-                                            <p:txEl>
-                                              <p:pRg st="2" end="2"/>
-                                            </p:txEl>
-                                          </p:spTgt>
-                                        </p:tgtEl>
-                                        <p:attrNameLst>
-                                          <p:attrName>style.visibility</p:attrName>
-                                        </p:attrNameLst>
-                                      </p:cBhvr>
-                                      <p:to>
-                                        <p:strVal val="visible"/>
-                                      </p:to>
-                                    </p:set>
-                                    <p:animEffect transition="in" filter="fade">
-                                      <p:cBhvr>
-                                        <p:cTn id="17" dur="500"/>
-                                        <p:tgtEl>
-                                          <p:spTgt spid="3">
-                                            <p:txEl>
-                                              <p:pRg st="2" end="2"/>
-                                            </p:txEl>
-                                          </p:spTgt>
-                                        </p:tgtEl>
-                                      </p:cBhvr>
-                                    </p:animEffect>
-                                  </p:childTnLst>
-                                </p:cTn>
-                              </p:par>
-                            </p:childTnLst>
-                          </p:cTn>
-                        </p:par>
-                      </p:childTnLst>
-                    </p:cTn>
-                  </p:par>
-                  <p:par>
-                    <p:cTn id="18" fill="hold">
-                      <p:stCondLst>
-                        <p:cond delay="indefinite"/>
-                      </p:stCondLst>
-                      <p:childTnLst>
-                        <p:par>
-                          <p:cTn id="19" fill="hold">
-                            <p:stCondLst>
-                              <p:cond delay="0"/>
-                            </p:stCondLst>
-                            <p:childTnLst>
-                              <p:par>
-                                <p:cTn id="20" presetID="10" presetClass="entr" presetSubtype="0" fill="hold" grpId="0" nodeType="clickEffect">
-                                  <p:stCondLst>
-                                    <p:cond delay="0"/>
-                                  </p:stCondLst>
-                                  <p:childTnLst>
-                                    <p:set>
-                                      <p:cBhvr>
-                                        <p:cTn id="21" dur="1" fill="hold">
-                                          <p:stCondLst>
-                                            <p:cond delay="0"/>
-                                          </p:stCondLst>
-                                        </p:cTn>
-                                        <p:tgtEl>
-                                          <p:spTgt spid="3">
-                                            <p:txEl>
-                                              <p:pRg st="3" end="3"/>
-                                            </p:txEl>
-                                          </p:spTgt>
-                                        </p:tgtEl>
-                                        <p:attrNameLst>
-                                          <p:attrName>style.visibility</p:attrName>
-                                        </p:attrNameLst>
-                                      </p:cBhvr>
-                                      <p:to>
-                                        <p:strVal val="visible"/>
-                                      </p:to>
-                                    </p:set>
-                                    <p:animEffect transition="in" filter="fade">
-                                      <p:cBhvr>
-                                        <p:cTn id="22" dur="500"/>
-                                        <p:tgtEl>
-                                          <p:spTgt spid="3">
-                                            <p:txEl>
-                                              <p:pRg st="3" end="3"/>
-                                            </p:txEl>
-                                          </p:spTgt>
-                                        </p:tgtEl>
-                                      </p:cBhvr>
-                                    </p:animEffect>
-                                  </p:childTnLst>
-                                </p:cTn>
-                              </p:par>
-                            </p:childTnLst>
-                          </p:cTn>
-                        </p:par>
-                      </p:childTnLst>
-                    </p:cTn>
-                  </p:par>
-                  <p:par>
-                    <p:cTn id="23" fill="hold">
-                      <p:stCondLst>
-                        <p:cond delay="indefinite"/>
-                      </p:stCondLst>
-                      <p:childTnLst>
-                        <p:par>
-                          <p:cTn id="24" fill="hold">
-                            <p:stCondLst>
-                              <p:cond delay="0"/>
-                            </p:stCondLst>
-                            <p:childTnLst>
-                              <p:par>
-                                <p:cTn id="25" presetID="10" presetClass="entr" presetSubtype="0" fill="hold" grpId="0" nodeType="clickEffect">
-                                  <p:stCondLst>
-                                    <p:cond delay="0"/>
-                                  </p:stCondLst>
-                                  <p:childTnLst>
-                                    <p:set>
-                                      <p:cBhvr>
-                                        <p:cTn id="26" dur="1" fill="hold">
-                                          <p:stCondLst>
-                                            <p:cond delay="0"/>
-                                          </p:stCondLst>
-                                        </p:cTn>
-                                        <p:tgtEl>
-                                          <p:spTgt spid="3">
-                                            <p:txEl>
-                                              <p:pRg st="4" end="4"/>
-                                            </p:txEl>
-                                          </p:spTgt>
-                                        </p:tgtEl>
-                                        <p:attrNameLst>
-                                          <p:attrName>style.visibility</p:attrName>
-                                        </p:attrNameLst>
-                                      </p:cBhvr>
-                                      <p:to>
-                                        <p:strVal val="visible"/>
-                                      </p:to>
-                                    </p:set>
-                                    <p:animEffect transition="in" filter="fade">
-                                      <p:cBhvr>
-                                        <p:cTn id="27" dur="500"/>
-                                        <p:tgtEl>
-                                          <p:spTgt spid="3">
-                                            <p:txEl>
-                                              <p:pRg st="4" end="4"/>
-                                            </p:txEl>
-                                          </p:spTgt>
-                                        </p:tgtEl>
-                                      </p:cBhvr>
-                                    </p:animEffect>
-                                  </p:childTnLst>
-                                </p:cTn>
-                              </p:par>
-                            </p:childTnLst>
-                          </p:cTn>
-                        </p:par>
-                      </p:childTnLst>
-                    </p:cTn>
-                  </p:par>
-                  <p:par>
-                    <p:cTn id="28" fill="hold">
-                      <p:stCondLst>
-                        <p:cond delay="indefinite"/>
-                      </p:stCondLst>
-                      <p:childTnLst>
-                        <p:par>
-                          <p:cTn id="29" fill="hold">
-                            <p:stCondLst>
-                              <p:cond delay="0"/>
-                            </p:stCondLst>
-                            <p:childTnLst>
-                              <p:par>
-                                <p:cTn id="30" presetID="10" presetClass="entr" presetSubtype="0" fill="hold" grpId="0" nodeType="clickEffect">
-                                  <p:stCondLst>
-                                    <p:cond delay="0"/>
-                                  </p:stCondLst>
-                                  <p:childTnLst>
-                                    <p:set>
-                                      <p:cBhvr>
-                                        <p:cTn id="31" dur="1" fill="hold">
-                                          <p:stCondLst>
-                                            <p:cond delay="0"/>
-                                          </p:stCondLst>
-                                        </p:cTn>
-                                        <p:tgtEl>
-                                          <p:spTgt spid="3">
-                                            <p:txEl>
-                                              <p:pRg st="5" end="5"/>
-                                            </p:txEl>
-                                          </p:spTgt>
-                                        </p:tgtEl>
-                                        <p:attrNameLst>
-                                          <p:attrName>style.visibility</p:attrName>
-                                        </p:attrNameLst>
-                                      </p:cBhvr>
-                                      <p:to>
-                                        <p:strVal val="visible"/>
-                                      </p:to>
-                                    </p:set>
-                                    <p:animEffect transition="in" filter="fade">
-                                      <p:cBhvr>
-                                        <p:cTn id="32" dur="500"/>
-                                        <p:tgtEl>
-                                          <p:spTgt spid="3">
-                                            <p:txEl>
-                                              <p:pRg st="5" end="5"/>
-                                            </p:txEl>
-                                          </p:spTgt>
-                                        </p:tgtEl>
-                                      </p:cBhvr>
-                                    </p:animEffect>
-                                  </p:childTnLst>
-                                </p:cTn>
-                              </p:par>
-                            </p:childTnLst>
-                          </p:cTn>
-                        </p:par>
-                      </p:childTnLst>
-                    </p:cTn>
-                  </p:par>
-                </p:childTnLst>
-              </p:cTn>
-              <p:prevCondLst>
-                <p:cond evt="onPrev" delay="0">
-                  <p:tgtEl>
-                    <p:sldTgt/>
-                  </p:tgtEl>
-                </p:cond>
-              </p:prevCondLst>
-              <p:nextCondLst>
-                <p:cond evt="onNext" delay="0">
-                  <p:tgtEl>
-                    <p:sldTgt/>
-                  </p:tgtEl>
-                </p:cond>
-              </p:nextCondLst>
-            </p:seq>
-          </p:childTnLst>
-        </p:cTn>
+        <p:cTn id="1" dur="indefinite" restart="never" nodeType="tmRoot"/>
       </p:par>
     </p:tnLst>
-    <p:bldLst>
-      <p:bldP spid="3" grpId="0" build="p"/>
-    </p:bldLst>
   </p:timing>
 </p:sld>
 </file>

</xml_diff>